<commit_message>
Finished updating the PPT.
</commit_message>
<xml_diff>
--- a/PPT/SaveTheChildren.pptx
+++ b/PPT/SaveTheChildren.pptx
@@ -5,7 +5,7 @@
     <p:sldMasterId id="2147483660" r:id="rId1"/>
   </p:sldMasterIdLst>
   <p:notesMasterIdLst>
-    <p:notesMasterId r:id="rId37"/>
+    <p:notesMasterId r:id="rId33"/>
   </p:notesMasterIdLst>
   <p:sldIdLst>
     <p:sldId id="256" r:id="rId2"/>
@@ -19,30 +19,26 @@
     <p:sldId id="282" r:id="rId10"/>
     <p:sldId id="283" r:id="rId11"/>
     <p:sldId id="284" r:id="rId12"/>
-    <p:sldId id="274" r:id="rId13"/>
-    <p:sldId id="258" r:id="rId14"/>
-    <p:sldId id="285" r:id="rId15"/>
-    <p:sldId id="286" r:id="rId16"/>
-    <p:sldId id="261" r:id="rId17"/>
-    <p:sldId id="287" r:id="rId18"/>
-    <p:sldId id="288" r:id="rId19"/>
-    <p:sldId id="289" r:id="rId20"/>
-    <p:sldId id="260" r:id="rId21"/>
-    <p:sldId id="263" r:id="rId22"/>
-    <p:sldId id="290" r:id="rId23"/>
-    <p:sldId id="291" r:id="rId24"/>
-    <p:sldId id="292" r:id="rId25"/>
-    <p:sldId id="293" r:id="rId26"/>
-    <p:sldId id="294" r:id="rId27"/>
-    <p:sldId id="295" r:id="rId28"/>
-    <p:sldId id="264" r:id="rId29"/>
-    <p:sldId id="267" r:id="rId30"/>
-    <p:sldId id="268" r:id="rId31"/>
-    <p:sldId id="269" r:id="rId32"/>
-    <p:sldId id="270" r:id="rId33"/>
-    <p:sldId id="271" r:id="rId34"/>
-    <p:sldId id="272" r:id="rId35"/>
-    <p:sldId id="273" r:id="rId36"/>
+    <p:sldId id="285" r:id="rId13"/>
+    <p:sldId id="286" r:id="rId14"/>
+    <p:sldId id="287" r:id="rId15"/>
+    <p:sldId id="288" r:id="rId16"/>
+    <p:sldId id="289" r:id="rId17"/>
+    <p:sldId id="290" r:id="rId18"/>
+    <p:sldId id="291" r:id="rId19"/>
+    <p:sldId id="292" r:id="rId20"/>
+    <p:sldId id="293" r:id="rId21"/>
+    <p:sldId id="294" r:id="rId22"/>
+    <p:sldId id="295" r:id="rId23"/>
+    <p:sldId id="296" r:id="rId24"/>
+    <p:sldId id="297" r:id="rId25"/>
+    <p:sldId id="301" r:id="rId26"/>
+    <p:sldId id="298" r:id="rId27"/>
+    <p:sldId id="299" r:id="rId28"/>
+    <p:sldId id="300" r:id="rId29"/>
+    <p:sldId id="302" r:id="rId30"/>
+    <p:sldId id="303" r:id="rId31"/>
+    <p:sldId id="304" r:id="rId32"/>
   </p:sldIdLst>
   <p:sldSz cx="9144000" cy="6858000" type="screen4x3"/>
   <p:notesSz cx="6858000" cy="9144000"/>
@@ -157,30 +153,26 @@
             <p14:sldId id="282"/>
             <p14:sldId id="283"/>
             <p14:sldId id="284"/>
-            <p14:sldId id="274"/>
-            <p14:sldId id="258"/>
             <p14:sldId id="285"/>
             <p14:sldId id="286"/>
-            <p14:sldId id="261"/>
             <p14:sldId id="287"/>
             <p14:sldId id="288"/>
             <p14:sldId id="289"/>
-            <p14:sldId id="260"/>
-            <p14:sldId id="263"/>
             <p14:sldId id="290"/>
             <p14:sldId id="291"/>
             <p14:sldId id="292"/>
             <p14:sldId id="293"/>
             <p14:sldId id="294"/>
             <p14:sldId id="295"/>
-            <p14:sldId id="264"/>
-            <p14:sldId id="267"/>
-            <p14:sldId id="268"/>
-            <p14:sldId id="269"/>
-            <p14:sldId id="270"/>
-            <p14:sldId id="271"/>
-            <p14:sldId id="272"/>
-            <p14:sldId id="273"/>
+            <p14:sldId id="296"/>
+            <p14:sldId id="297"/>
+            <p14:sldId id="301"/>
+            <p14:sldId id="298"/>
+            <p14:sldId id="299"/>
+            <p14:sldId id="300"/>
+            <p14:sldId id="302"/>
+            <p14:sldId id="303"/>
+            <p14:sldId id="304"/>
           </p14:sldIdLst>
         </p14:section>
       </p14:sectionLst>
@@ -680,65 +672,7 @@
           <a:bodyPr/>
           <a:lstStyle/>
           <a:p>
-            <a:r>
-              <a:rPr lang="en-US" dirty="0" smtClean="0"/>
-              <a:t>Here the use has the fields for the extra details:</a:t>
-            </a:r>
-          </a:p>
-          <a:p>
-            <a:pPr marL="171450" indent="-171450">
-              <a:buFontTx/>
-              <a:buChar char="-"/>
-            </a:pPr>
-            <a:r>
-              <a:rPr lang="en-US" dirty="0" smtClean="0"/>
-              <a:t>Date of the incident</a:t>
-            </a:r>
-          </a:p>
-          <a:p>
-            <a:pPr marL="171450" indent="-171450">
-              <a:buFontTx/>
-              <a:buChar char="-"/>
-            </a:pPr>
-            <a:r>
-              <a:rPr lang="en-US" dirty="0" smtClean="0"/>
-              <a:t>Time</a:t>
-            </a:r>
-          </a:p>
-          <a:p>
-            <a:pPr marL="171450" indent="-171450">
-              <a:buFontTx/>
-              <a:buChar char="-"/>
-            </a:pPr>
-            <a:r>
-              <a:rPr lang="en-US" dirty="0" smtClean="0"/>
-              <a:t>Location (free form) which can be an address or it has the capability to drop a pin on the map (pin it down option)</a:t>
-            </a:r>
-          </a:p>
-          <a:p>
-            <a:pPr marL="171450" indent="-171450">
-              <a:buFontTx/>
-              <a:buChar char="-"/>
-            </a:pPr>
-            <a:r>
-              <a:rPr lang="en-US" dirty="0" smtClean="0"/>
-              <a:t>Pictures</a:t>
-            </a:r>
-            <a:r>
-              <a:rPr lang="en-US" baseline="0" dirty="0" smtClean="0"/>
-              <a:t> can be attached</a:t>
-            </a:r>
-          </a:p>
-          <a:p>
-            <a:pPr marL="171450" indent="-171450">
-              <a:buFontTx/>
-              <a:buChar char="-"/>
-            </a:pPr>
-            <a:r>
-              <a:rPr lang="en-US" baseline="0" dirty="0" smtClean="0"/>
-              <a:t>Any other information free field</a:t>
-            </a:r>
-            <a:endParaRPr lang="en-US" dirty="0"/>
+            <a:endParaRPr lang="en-US" dirty="0" smtClean="0"/>
           </a:p>
         </p:txBody>
       </p:sp>
@@ -759,7 +693,7 @@
           <a:p>
             <a:fld id="{C852EBCA-43E0-8746-ADE2-07FDA1D34571}" type="slidenum">
               <a:rPr lang="en-US" smtClean="0"/>
-              <a:t>17</a:t>
+              <a:t>16</a:t>
             </a:fld>
             <a:endParaRPr lang="en-US"/>
           </a:p>
@@ -824,88 +758,23 @@
           <a:p>
             <a:r>
               <a:rPr lang="en-US" dirty="0" smtClean="0"/>
-              <a:t>Here the use has the fields for the extra details:</a:t>
-            </a:r>
-          </a:p>
-          <a:p>
-            <a:pPr marL="171450" indent="-171450">
-              <a:buFontTx/>
-              <a:buChar char="-"/>
-            </a:pPr>
-            <a:r>
-              <a:rPr lang="en-US" dirty="0" smtClean="0"/>
-              <a:t>Date of the incident</a:t>
-            </a:r>
-          </a:p>
-          <a:p>
-            <a:pPr marL="171450" indent="-171450">
-              <a:buFontTx/>
-              <a:buChar char="-"/>
-            </a:pPr>
-            <a:r>
-              <a:rPr lang="en-US" dirty="0" smtClean="0"/>
-              <a:t>Time</a:t>
-            </a:r>
-          </a:p>
-          <a:p>
-            <a:pPr marL="171450" indent="-171450">
-              <a:buFontTx/>
-              <a:buChar char="-"/>
-            </a:pPr>
-            <a:r>
-              <a:rPr lang="en-US" dirty="0" smtClean="0"/>
-              <a:t>Location (free form) which can be an address or it has the capability to drop a pin on the map (pin it down option)</a:t>
-            </a:r>
-          </a:p>
-          <a:p>
-            <a:pPr marL="171450" indent="-171450">
-              <a:buFontTx/>
-              <a:buChar char="-"/>
-            </a:pPr>
-            <a:r>
-              <a:rPr lang="en-US" dirty="0" smtClean="0"/>
-              <a:t>Pictures</a:t>
+              <a:t>Here the admin person can sort the</a:t>
             </a:r>
             <a:r>
               <a:rPr lang="en-US" baseline="0" dirty="0" smtClean="0"/>
-              <a:t> can be attached</a:t>
-            </a:r>
-          </a:p>
-          <a:p>
-            <a:pPr marL="171450" indent="-171450">
-              <a:buFontTx/>
-              <a:buChar char="-"/>
-            </a:pPr>
+              <a:t> reports</a:t>
+            </a:r>
+          </a:p>
+          <a:p>
             <a:r>
               <a:rPr lang="en-US" baseline="0" dirty="0" smtClean="0"/>
-              <a:t>GPS location</a:t>
-            </a:r>
-          </a:p>
-          <a:p>
-            <a:pPr marL="171450" indent="-171450">
-              <a:buFontTx/>
-              <a:buChar char="-"/>
-            </a:pPr>
+              <a:t>View the details</a:t>
+            </a:r>
+          </a:p>
+          <a:p>
             <a:r>
               <a:rPr lang="en-US" baseline="0" dirty="0" smtClean="0"/>
-              <a:t>Any other information free field</a:t>
-            </a:r>
-          </a:p>
-          <a:p>
-            <a:pPr marL="171450" indent="-171450">
-              <a:buFontTx/>
-              <a:buChar char="-"/>
-            </a:pPr>
-            <a:endParaRPr lang="en-US" baseline="0" dirty="0" smtClean="0"/>
-          </a:p>
-          <a:p>
-            <a:pPr marL="0" indent="0">
-              <a:buFontTx/>
-              <a:buNone/>
-            </a:pPr>
-            <a:r>
-              <a:rPr lang="en-US" baseline="0" dirty="0" smtClean="0"/>
-              <a:t>This information can be submitted instantly or store and submitted when internet connection is available.</a:t>
+              <a:t>Action the reports (i.e. dismiss, further action)</a:t>
             </a:r>
             <a:endParaRPr lang="en-US" dirty="0"/>
           </a:p>
@@ -928,7 +797,7 @@
           <a:p>
             <a:fld id="{C852EBCA-43E0-8746-ADE2-07FDA1D34571}" type="slidenum">
               <a:rPr lang="en-US" smtClean="0"/>
-              <a:t>18</a:t>
+              <a:t>20</a:t>
             </a:fld>
             <a:endParaRPr lang="en-US"/>
           </a:p>
@@ -937,7 +806,7 @@
     </p:spTree>
     <p:extLst>
       <p:ext uri="{BB962C8B-B14F-4D97-AF65-F5344CB8AC3E}">
-        <p14:creationId xmlns:p14="http://schemas.microsoft.com/office/powerpoint/2010/main" val="1462002074"/>
+        <p14:creationId xmlns:p14="http://schemas.microsoft.com/office/powerpoint/2010/main" val="426158179"/>
       </p:ext>
     </p:extLst>
   </p:cSld>
@@ -991,7 +860,143 @@
           <a:bodyPr/>
           <a:lstStyle/>
           <a:p>
+            <a:r>
+              <a:rPr lang="en-US" dirty="0" smtClean="0"/>
+              <a:t>An admin person will be able to login into the portal and monitor distribution of aid, track the packages, check package content and so</a:t>
+            </a:r>
+            <a:r>
+              <a:rPr lang="en-US" baseline="0" dirty="0" smtClean="0"/>
+              <a:t> on…</a:t>
+            </a:r>
+          </a:p>
+          <a:p>
+            <a:endParaRPr lang="en-US" baseline="0" dirty="0" smtClean="0"/>
+          </a:p>
+          <a:p>
+            <a:r>
+              <a:rPr lang="en-US" baseline="0" dirty="0" smtClean="0"/>
+              <a:t>Here we have </a:t>
+            </a:r>
+            <a:r>
+              <a:rPr lang="en-US" baseline="0" dirty="0" err="1" smtClean="0"/>
+              <a:t>newuronetwork</a:t>
+            </a:r>
+            <a:r>
+              <a:rPr lang="en-US" baseline="0" dirty="0" smtClean="0"/>
+              <a:t> representation of aid tracking. It is split in 4 major points:</a:t>
+            </a:r>
+          </a:p>
+          <a:p>
+            <a:pPr marL="171450" indent="-171450">
+              <a:buFont typeface="Arial"/>
+              <a:buChar char="•"/>
+            </a:pPr>
+            <a:r>
+              <a:rPr lang="en-US" baseline="0" dirty="0" smtClean="0"/>
+              <a:t>Small dots – donators / beneficiaries </a:t>
+            </a:r>
+          </a:p>
+          <a:p>
+            <a:pPr marL="171450" indent="-171450">
+              <a:buFont typeface="Arial"/>
+              <a:buChar char="•"/>
+            </a:pPr>
+            <a:r>
+              <a:rPr lang="en-US" baseline="0" dirty="0" smtClean="0"/>
+              <a:t>Red circles – collection nodes/points</a:t>
+            </a:r>
+          </a:p>
+          <a:p>
+            <a:pPr marL="171450" indent="-171450">
+              <a:buFont typeface="Arial"/>
+              <a:buChar char="•"/>
+            </a:pPr>
+            <a:r>
+              <a:rPr lang="en-US" baseline="0" dirty="0" smtClean="0"/>
+              <a:t>Blue circles – storage centers</a:t>
+            </a:r>
+          </a:p>
+          <a:p>
+            <a:pPr marL="171450" indent="-171450">
+              <a:buFont typeface="Arial"/>
+              <a:buChar char="•"/>
+            </a:pPr>
+            <a:r>
+              <a:rPr lang="en-US" baseline="0" dirty="0" smtClean="0"/>
+              <a:t>Orange circles – distribution nodes</a:t>
+            </a:r>
+          </a:p>
+          <a:p>
+            <a:pPr marL="171450" indent="-171450">
+              <a:buFont typeface="Arial"/>
+              <a:buChar char="•"/>
+            </a:pPr>
+            <a:r>
+              <a:rPr lang="en-US" baseline="0" dirty="0" smtClean="0"/>
+              <a:t>Green lines – distribution line, the package either has arrived or is on route and on schedule</a:t>
+            </a:r>
+          </a:p>
+          <a:p>
+            <a:pPr marL="171450" indent="-171450">
+              <a:buFont typeface="Arial"/>
+              <a:buChar char="•"/>
+            </a:pPr>
+            <a:r>
+              <a:rPr lang="en-US" baseline="0" dirty="0" smtClean="0"/>
+              <a:t>Orange line – the package is on route but is already delayed in arriving at destination</a:t>
+            </a:r>
+          </a:p>
+          <a:p>
+            <a:pPr marL="171450" indent="-171450">
+              <a:buFont typeface="Arial"/>
+              <a:buChar char="•"/>
+            </a:pPr>
+            <a:r>
+              <a:rPr lang="en-US" baseline="0" dirty="0" smtClean="0"/>
+              <a:t>Red lines – none here – the package is significantly delayed, no update known  - check follow up</a:t>
+            </a:r>
+          </a:p>
+          <a:p>
+            <a:pPr marL="171450" indent="-171450">
+              <a:buFont typeface="Arial"/>
+              <a:buChar char="•"/>
+            </a:pPr>
+            <a:r>
+              <a:rPr lang="en-US" baseline="0" dirty="0" smtClean="0"/>
+              <a:t>Grey lines – no package is being tracked trough that route. </a:t>
+            </a:r>
+          </a:p>
+          <a:p>
+            <a:pPr marL="171450" indent="-171450">
+              <a:buFont typeface="Arial"/>
+              <a:buChar char="•"/>
+            </a:pPr>
             <a:endParaRPr lang="en-US" dirty="0" smtClean="0"/>
+          </a:p>
+          <a:p>
+            <a:pPr marL="0" indent="0">
+              <a:buFont typeface="Arial"/>
+              <a:buNone/>
+            </a:pPr>
+            <a:r>
+              <a:rPr lang="en-US" dirty="0" smtClean="0"/>
+              <a:t>Tracking can be done either by GPS</a:t>
+            </a:r>
+            <a:r>
+              <a:rPr lang="en-US" baseline="0" dirty="0" smtClean="0"/>
+              <a:t> or simple by entering in the system the destination. I.e. driver goes from point A to point B, submits in the system that aids is going to B, there is already an estimate for that route that it takes 20 h. After 20 h the lines turns orange, after 30 h turns red.</a:t>
+            </a:r>
+          </a:p>
+          <a:p>
+            <a:pPr marL="0" indent="0">
+              <a:buFont typeface="Arial"/>
+              <a:buNone/>
+            </a:pPr>
+            <a:r>
+              <a:rPr lang="en-US" baseline="0" dirty="0" smtClean="0"/>
+              <a:t>More functionality can be added, like route duration adjustments, if the route from A to B takes 25h every time, then the default duration is updated by the system/admin….</a:t>
+            </a:r>
+            <a:endParaRPr lang="en-US" dirty="0"/>
           </a:p>
         </p:txBody>
       </p:sp>
@@ -1012,7 +1017,7 @@
           <a:p>
             <a:fld id="{C852EBCA-43E0-8746-ADE2-07FDA1D34571}" type="slidenum">
               <a:rPr lang="en-US" smtClean="0"/>
-              <a:t>19</a:t>
+              <a:t>24</a:t>
             </a:fld>
             <a:endParaRPr lang="en-US"/>
           </a:p>
@@ -1021,7 +1026,7 @@
     </p:spTree>
     <p:extLst>
       <p:ext uri="{BB962C8B-B14F-4D97-AF65-F5344CB8AC3E}">
-        <p14:creationId xmlns:p14="http://schemas.microsoft.com/office/powerpoint/2010/main" val="1462002074"/>
+        <p14:creationId xmlns:p14="http://schemas.microsoft.com/office/powerpoint/2010/main" val="3519890085"/>
       </p:ext>
     </p:extLst>
   </p:cSld>
@@ -1077,24 +1082,107 @@
           <a:p>
             <a:r>
               <a:rPr lang="en-US" dirty="0" smtClean="0"/>
-              <a:t>Here the admin person can sort the</a:t>
+              <a:t>Member of public,</a:t>
             </a:r>
             <a:r>
               <a:rPr lang="en-US" baseline="0" dirty="0" smtClean="0"/>
-              <a:t> reports</a:t>
-            </a:r>
+              <a:t> companies or aid workers on the ground have the capability of submitting requests for creating (adding to the network) nodes.</a:t>
+            </a:r>
+          </a:p>
+          <a:p>
+            <a:endParaRPr lang="en-US" baseline="0" dirty="0" smtClean="0"/>
           </a:p>
           <a:p>
             <a:r>
               <a:rPr lang="en-US" baseline="0" dirty="0" smtClean="0"/>
-              <a:t>View the details</a:t>
-            </a:r>
-          </a:p>
-          <a:p>
+              <a:t>For example:</a:t>
+            </a:r>
+          </a:p>
+          <a:p>
+            <a:pPr marL="228600" indent="-228600">
+              <a:buAutoNum type="arabicParenR"/>
+            </a:pPr>
             <a:r>
               <a:rPr lang="en-US" baseline="0" dirty="0" smtClean="0"/>
-              <a:t>Action the reports (i.e. dismiss, further action)</a:t>
-            </a:r>
+              <a:t>A church / school setup an event where they are going to collect aid, they make a request to register a </a:t>
+            </a:r>
+            <a:r>
+              <a:rPr lang="en-US" b="1" baseline="0" dirty="0" smtClean="0"/>
+              <a:t>collection node</a:t>
+            </a:r>
+            <a:r>
+              <a:rPr lang="en-US" baseline="0" dirty="0" smtClean="0"/>
+              <a:t>. This can be approved by admin and as a result monitor progress provide help support. </a:t>
+            </a:r>
+          </a:p>
+          <a:p>
+            <a:pPr marL="228600" indent="-228600">
+              <a:buAutoNum type="arabicParenR"/>
+            </a:pPr>
+            <a:r>
+              <a:rPr lang="en-US" baseline="0" dirty="0" smtClean="0"/>
+              <a:t>A company has a storage facility next to the </a:t>
+            </a:r>
+            <a:r>
+              <a:rPr lang="en-US" baseline="0" dirty="0" err="1" smtClean="0"/>
+              <a:t>blackbushe</a:t>
+            </a:r>
+            <a:r>
+              <a:rPr lang="en-US" baseline="0" dirty="0" smtClean="0"/>
+              <a:t> airport, it is not continuously used, during a disaster, they decide to offer temporary their facilities to the </a:t>
+            </a:r>
+            <a:r>
+              <a:rPr lang="en-US" baseline="0" dirty="0" err="1" smtClean="0"/>
+              <a:t>SaveTheChildrenOrganisation</a:t>
+            </a:r>
+            <a:r>
+              <a:rPr lang="en-US" baseline="0" dirty="0" smtClean="0"/>
+              <a:t> so that it can be used as a storage </a:t>
+            </a:r>
+            <a:r>
+              <a:rPr lang="en-US" baseline="0" dirty="0" err="1" smtClean="0"/>
+              <a:t>faciity</a:t>
+            </a:r>
+            <a:r>
+              <a:rPr lang="en-US" baseline="0" dirty="0" smtClean="0"/>
+              <a:t>, or grouping further distribution. They register a </a:t>
+            </a:r>
+            <a:r>
+              <a:rPr lang="en-US" b="1" baseline="0" dirty="0" smtClean="0"/>
+              <a:t>storage node</a:t>
+            </a:r>
+            <a:r>
+              <a:rPr lang="en-US" baseline="0" dirty="0" smtClean="0"/>
+              <a:t>.</a:t>
+            </a:r>
+          </a:p>
+          <a:p>
+            <a:pPr marL="228600" indent="-228600">
+              <a:buAutoNum type="arabicParenR"/>
+            </a:pPr>
+            <a:r>
+              <a:rPr lang="en-US" baseline="0" dirty="0" smtClean="0"/>
+              <a:t>An aid worker in Calais sees the crisis escalating and request for aid to help the children in need, they register a </a:t>
+            </a:r>
+            <a:r>
+              <a:rPr lang="en-US" b="1" baseline="0" dirty="0" smtClean="0"/>
+              <a:t>distribution node</a:t>
+            </a:r>
+            <a:r>
+              <a:rPr lang="en-US" baseline="0" dirty="0" smtClean="0"/>
+              <a:t>. This is added to the network an helps to monitor track, aid to those nodes.</a:t>
+            </a:r>
+          </a:p>
+          <a:p>
+            <a:pPr marL="228600" indent="-228600">
+              <a:buAutoNum type="arabicParenR"/>
+            </a:pPr>
+            <a:endParaRPr lang="en-US" baseline="0" dirty="0" smtClean="0"/>
+          </a:p>
+          <a:p>
+            <a:pPr marL="228600" indent="-228600">
+              <a:buAutoNum type="arabicParenR"/>
+            </a:pPr>
             <a:endParaRPr lang="en-US" dirty="0"/>
           </a:p>
         </p:txBody>
@@ -1116,7 +1204,7 @@
           <a:p>
             <a:fld id="{C852EBCA-43E0-8746-ADE2-07FDA1D34571}" type="slidenum">
               <a:rPr lang="en-US" smtClean="0"/>
-              <a:t>25</a:t>
+              <a:t>26</a:t>
             </a:fld>
             <a:endParaRPr lang="en-US"/>
           </a:p>
@@ -1125,7 +1213,7 @@
     </p:spTree>
     <p:extLst>
       <p:ext uri="{BB962C8B-B14F-4D97-AF65-F5344CB8AC3E}">
-        <p14:creationId xmlns:p14="http://schemas.microsoft.com/office/powerpoint/2010/main" val="426158179"/>
+        <p14:creationId xmlns:p14="http://schemas.microsoft.com/office/powerpoint/2010/main" val="3519890085"/>
       </p:ext>
     </p:extLst>
   </p:cSld>
@@ -1718,6 +1806,18 @@
           <a:bodyPr/>
           <a:lstStyle/>
           <a:p>
+            <a:r>
+              <a:rPr lang="en-US" dirty="0" smtClean="0"/>
+              <a:t>This is an example of homepage for existing user: Tanya </a:t>
+            </a:r>
+            <a:r>
+              <a:rPr lang="en-US" dirty="0" err="1" smtClean="0"/>
+              <a:t>Mojeck</a:t>
+            </a:r>
+            <a:r>
+              <a:rPr lang="en-US" dirty="0" smtClean="0"/>
+              <a:t> who is a midwife</a:t>
+            </a:r>
             <a:endParaRPr lang="en-US" dirty="0"/>
           </a:p>
         </p:txBody>
@@ -1748,7 +1848,7 @@
     </p:spTree>
     <p:extLst>
       <p:ext uri="{BB962C8B-B14F-4D97-AF65-F5344CB8AC3E}">
-        <p14:creationId xmlns:p14="http://schemas.microsoft.com/office/powerpoint/2010/main" val="1986452651"/>
+        <p14:creationId xmlns:p14="http://schemas.microsoft.com/office/powerpoint/2010/main" val="138351682"/>
       </p:ext>
     </p:extLst>
   </p:cSld>
@@ -1802,18 +1902,104 @@
           <a:bodyPr/>
           <a:lstStyle/>
           <a:p>
-            <a:r>
-              <a:rPr lang="en-US" dirty="0" smtClean="0"/>
-              <a:t>This is an example of homepage for existing user: Tanya </a:t>
-            </a:r>
-            <a:r>
-              <a:rPr lang="en-US" dirty="0" err="1" smtClean="0"/>
-              <a:t>Mojeck</a:t>
-            </a:r>
-            <a:r>
-              <a:rPr lang="en-US" dirty="0" smtClean="0"/>
-              <a:t> who is a midwife</a:t>
-            </a:r>
+            <a:pPr marL="0" lvl="0" indent="0" algn="l">
+              <a:buNone/>
+            </a:pPr>
+            <a:r>
+              <a:rPr lang="en-GB" sz="1200" dirty="0" smtClean="0">
+                <a:solidFill>
+                  <a:srgbClr val="FF0000"/>
+                </a:solidFill>
+              </a:rPr>
+              <a:t>Report a violation questionnaire examples</a:t>
+            </a:r>
+          </a:p>
+          <a:p>
+            <a:pPr lvl="0"/>
+            <a:endParaRPr lang="en-GB" sz="1200" dirty="0" smtClean="0">
+              <a:solidFill>
+                <a:srgbClr val="FF0000"/>
+              </a:solidFill>
+            </a:endParaRPr>
+          </a:p>
+          <a:p>
+            <a:pPr lvl="0"/>
+            <a:r>
+              <a:rPr lang="en-GB" sz="1200" dirty="0" smtClean="0">
+                <a:solidFill>
+                  <a:srgbClr val="FF0000"/>
+                </a:solidFill>
+              </a:rPr>
+              <a:t>Are free samples or feeding equipment being handed out?  </a:t>
+            </a:r>
+          </a:p>
+          <a:p>
+            <a:pPr lvl="0"/>
+            <a:r>
+              <a:rPr lang="en-GB" sz="1200" dirty="0" smtClean="0">
+                <a:solidFill>
+                  <a:srgbClr val="FF0000"/>
+                </a:solidFill>
+              </a:rPr>
+              <a:t>Are company reps receiving bonuses related to sales?</a:t>
+            </a:r>
+          </a:p>
+          <a:p>
+            <a:pPr lvl="0"/>
+            <a:r>
+              <a:rPr lang="en-GB" sz="1200" dirty="0" smtClean="0">
+                <a:solidFill>
+                  <a:srgbClr val="FF0000"/>
+                </a:solidFill>
+              </a:rPr>
+              <a:t>Is the baby formula being advertised?</a:t>
+            </a:r>
+          </a:p>
+          <a:p>
+            <a:pPr lvl="0"/>
+            <a:r>
+              <a:rPr lang="en-GB" sz="1200" dirty="0" smtClean="0">
+                <a:solidFill>
+                  <a:srgbClr val="FF0000"/>
+                </a:solidFill>
+              </a:rPr>
+              <a:t>Is this being recommended as an alternative to breast feeding?</a:t>
+            </a:r>
+          </a:p>
+          <a:p>
+            <a:pPr lvl="0"/>
+            <a:r>
+              <a:rPr lang="en-GB" sz="1200" dirty="0" smtClean="0">
+                <a:solidFill>
+                  <a:srgbClr val="FF0000"/>
+                </a:solidFill>
+              </a:rPr>
+              <a:t>Is breast feeding being discouraged?</a:t>
+            </a:r>
+          </a:p>
+          <a:p>
+            <a:pPr lvl="0"/>
+            <a:r>
+              <a:rPr lang="en-GB" sz="1200" dirty="0" smtClean="0">
+                <a:solidFill>
+                  <a:srgbClr val="FF0000"/>
+                </a:solidFill>
+              </a:rPr>
+              <a:t>Are company reps contacting mothers and families directly?</a:t>
+            </a:r>
+          </a:p>
+          <a:p>
+            <a:pPr lvl="0"/>
+            <a:r>
+              <a:rPr lang="en-GB" sz="1200" dirty="0" smtClean="0">
+                <a:solidFill>
+                  <a:srgbClr val="FF0000"/>
+                </a:solidFill>
+              </a:rPr>
+              <a:t>Have the donations been requested by the government?</a:t>
+            </a:r>
+          </a:p>
+          <a:p>
             <a:endParaRPr lang="en-US" dirty="0"/>
           </a:p>
         </p:txBody>
@@ -1835,7 +2021,7 @@
           <a:p>
             <a:fld id="{C852EBCA-43E0-8746-ADE2-07FDA1D34571}" type="slidenum">
               <a:rPr lang="en-US" smtClean="0"/>
-              <a:t>14</a:t>
+              <a:t>13</a:t>
             </a:fld>
             <a:endParaRPr lang="en-US"/>
           </a:p>
@@ -1844,7 +2030,7 @@
     </p:spTree>
     <p:extLst>
       <p:ext uri="{BB962C8B-B14F-4D97-AF65-F5344CB8AC3E}">
-        <p14:creationId xmlns:p14="http://schemas.microsoft.com/office/powerpoint/2010/main" val="138351682"/>
+        <p14:creationId xmlns:p14="http://schemas.microsoft.com/office/powerpoint/2010/main" val="3848120458"/>
       </p:ext>
     </p:extLst>
   </p:cSld>
@@ -1898,104 +2084,64 @@
           <a:bodyPr/>
           <a:lstStyle/>
           <a:p>
-            <a:pPr marL="0" lvl="0" indent="0" algn="l">
-              <a:buNone/>
+            <a:r>
+              <a:rPr lang="en-US" dirty="0" smtClean="0"/>
+              <a:t>Here the use has the fields for the extra details:</a:t>
+            </a:r>
+          </a:p>
+          <a:p>
+            <a:pPr marL="171450" indent="-171450">
+              <a:buFontTx/>
+              <a:buChar char="-"/>
             </a:pPr>
             <a:r>
-              <a:rPr lang="en-GB" sz="1200" dirty="0" smtClean="0">
-                <a:solidFill>
-                  <a:srgbClr val="FF0000"/>
-                </a:solidFill>
-              </a:rPr>
-              <a:t>Report a violation questionnaire examples</a:t>
-            </a:r>
-          </a:p>
-          <a:p>
-            <a:pPr lvl="0"/>
-            <a:endParaRPr lang="en-GB" sz="1200" dirty="0" smtClean="0">
-              <a:solidFill>
-                <a:srgbClr val="FF0000"/>
-              </a:solidFill>
-            </a:endParaRPr>
-          </a:p>
-          <a:p>
-            <a:pPr lvl="0"/>
-            <a:r>
-              <a:rPr lang="en-GB" sz="1200" dirty="0" smtClean="0">
-                <a:solidFill>
-                  <a:srgbClr val="FF0000"/>
-                </a:solidFill>
-              </a:rPr>
-              <a:t>Are free samples or feeding equipment being handed out?  </a:t>
-            </a:r>
-          </a:p>
-          <a:p>
-            <a:pPr lvl="0"/>
-            <a:r>
-              <a:rPr lang="en-GB" sz="1200" dirty="0" smtClean="0">
-                <a:solidFill>
-                  <a:srgbClr val="FF0000"/>
-                </a:solidFill>
-              </a:rPr>
-              <a:t>Are company reps receiving bonuses related to sales?</a:t>
-            </a:r>
-          </a:p>
-          <a:p>
-            <a:pPr lvl="0"/>
-            <a:r>
-              <a:rPr lang="en-GB" sz="1200" dirty="0" smtClean="0">
-                <a:solidFill>
-                  <a:srgbClr val="FF0000"/>
-                </a:solidFill>
-              </a:rPr>
-              <a:t>Is the baby formula being advertised?</a:t>
-            </a:r>
-          </a:p>
-          <a:p>
-            <a:pPr lvl="0"/>
-            <a:r>
-              <a:rPr lang="en-GB" sz="1200" dirty="0" smtClean="0">
-                <a:solidFill>
-                  <a:srgbClr val="FF0000"/>
-                </a:solidFill>
-              </a:rPr>
-              <a:t>Is this being recommended as an alternative to breast feeding?</a:t>
-            </a:r>
-          </a:p>
-          <a:p>
-            <a:pPr lvl="0"/>
-            <a:r>
-              <a:rPr lang="en-GB" sz="1200" dirty="0" smtClean="0">
-                <a:solidFill>
-                  <a:srgbClr val="FF0000"/>
-                </a:solidFill>
-              </a:rPr>
-              <a:t>Is breast feeding being discouraged?</a:t>
-            </a:r>
-          </a:p>
-          <a:p>
-            <a:pPr lvl="0"/>
-            <a:r>
-              <a:rPr lang="en-GB" sz="1200" dirty="0" smtClean="0">
-                <a:solidFill>
-                  <a:srgbClr val="FF0000"/>
-                </a:solidFill>
-              </a:rPr>
-              <a:t>Are company reps contacting mothers and families directly?</a:t>
-            </a:r>
-          </a:p>
-          <a:p>
-            <a:pPr lvl="0"/>
-            <a:r>
-              <a:rPr lang="en-GB" sz="1200" dirty="0" smtClean="0">
-                <a:solidFill>
-                  <a:srgbClr val="FF0000"/>
-                </a:solidFill>
-              </a:rPr>
-              <a:t>Have the donations been requested by the government?</a:t>
-            </a:r>
-          </a:p>
-          <a:p>
+              <a:rPr lang="en-US" dirty="0" smtClean="0"/>
+              <a:t>Date of the incident</a:t>
+            </a:r>
+          </a:p>
+          <a:p>
+            <a:pPr marL="171450" indent="-171450">
+              <a:buFontTx/>
+              <a:buChar char="-"/>
+            </a:pPr>
+            <a:r>
+              <a:rPr lang="en-US" dirty="0" smtClean="0"/>
+              <a:t>Time</a:t>
+            </a:r>
+          </a:p>
+          <a:p>
+            <a:pPr marL="171450" indent="-171450">
+              <a:buFontTx/>
+              <a:buChar char="-"/>
+            </a:pPr>
+            <a:r>
+              <a:rPr lang="en-US" dirty="0" smtClean="0"/>
+              <a:t>Location (free form) which can be an address or it has the capability to drop a pin on the map (pin it down option)</a:t>
+            </a:r>
+          </a:p>
+          <a:p>
+            <a:pPr marL="171450" indent="-171450">
+              <a:buFontTx/>
+              <a:buChar char="-"/>
+            </a:pPr>
+            <a:r>
+              <a:rPr lang="en-US" dirty="0" smtClean="0"/>
+              <a:t>Pictures</a:t>
+            </a:r>
+            <a:r>
+              <a:rPr lang="en-US" baseline="0" dirty="0" smtClean="0"/>
+              <a:t> can be attached</a:t>
+            </a:r>
+          </a:p>
+          <a:p>
+            <a:pPr marL="171450" indent="-171450">
+              <a:buFontTx/>
+              <a:buChar char="-"/>
+            </a:pPr>
+            <a:r>
+              <a:rPr lang="en-US" baseline="0" dirty="0" smtClean="0"/>
+              <a:t>Any other information free field</a:t>
+            </a:r>
             <a:endParaRPr lang="en-US" dirty="0"/>
           </a:p>
         </p:txBody>
@@ -2017,7 +2163,7 @@
           <a:p>
             <a:fld id="{C852EBCA-43E0-8746-ADE2-07FDA1D34571}" type="slidenum">
               <a:rPr lang="en-US" smtClean="0"/>
-              <a:t>15</a:t>
+              <a:t>14</a:t>
             </a:fld>
             <a:endParaRPr lang="en-US"/>
           </a:p>
@@ -2026,7 +2172,7 @@
     </p:spTree>
     <p:extLst>
       <p:ext uri="{BB962C8B-B14F-4D97-AF65-F5344CB8AC3E}">
-        <p14:creationId xmlns:p14="http://schemas.microsoft.com/office/powerpoint/2010/main" val="3848120458"/>
+        <p14:creationId xmlns:p14="http://schemas.microsoft.com/office/powerpoint/2010/main" val="1462002074"/>
       </p:ext>
     </p:extLst>
   </p:cSld>
@@ -2080,6 +2226,91 @@
           <a:bodyPr/>
           <a:lstStyle/>
           <a:p>
+            <a:r>
+              <a:rPr lang="en-US" dirty="0" smtClean="0"/>
+              <a:t>Here the use has the fields for the extra details:</a:t>
+            </a:r>
+          </a:p>
+          <a:p>
+            <a:pPr marL="171450" indent="-171450">
+              <a:buFontTx/>
+              <a:buChar char="-"/>
+            </a:pPr>
+            <a:r>
+              <a:rPr lang="en-US" dirty="0" smtClean="0"/>
+              <a:t>Date of the incident</a:t>
+            </a:r>
+          </a:p>
+          <a:p>
+            <a:pPr marL="171450" indent="-171450">
+              <a:buFontTx/>
+              <a:buChar char="-"/>
+            </a:pPr>
+            <a:r>
+              <a:rPr lang="en-US" dirty="0" smtClean="0"/>
+              <a:t>Time</a:t>
+            </a:r>
+          </a:p>
+          <a:p>
+            <a:pPr marL="171450" indent="-171450">
+              <a:buFontTx/>
+              <a:buChar char="-"/>
+            </a:pPr>
+            <a:r>
+              <a:rPr lang="en-US" dirty="0" smtClean="0"/>
+              <a:t>Location (free form) which can be an address or it has the capability to drop a pin on the map (pin it down option)</a:t>
+            </a:r>
+          </a:p>
+          <a:p>
+            <a:pPr marL="171450" indent="-171450">
+              <a:buFontTx/>
+              <a:buChar char="-"/>
+            </a:pPr>
+            <a:r>
+              <a:rPr lang="en-US" dirty="0" smtClean="0"/>
+              <a:t>Pictures</a:t>
+            </a:r>
+            <a:r>
+              <a:rPr lang="en-US" baseline="0" dirty="0" smtClean="0"/>
+              <a:t> can be attached</a:t>
+            </a:r>
+          </a:p>
+          <a:p>
+            <a:pPr marL="171450" indent="-171450">
+              <a:buFontTx/>
+              <a:buChar char="-"/>
+            </a:pPr>
+            <a:r>
+              <a:rPr lang="en-US" baseline="0" dirty="0" smtClean="0"/>
+              <a:t>GPS location</a:t>
+            </a:r>
+          </a:p>
+          <a:p>
+            <a:pPr marL="171450" indent="-171450">
+              <a:buFontTx/>
+              <a:buChar char="-"/>
+            </a:pPr>
+            <a:r>
+              <a:rPr lang="en-US" baseline="0" dirty="0" smtClean="0"/>
+              <a:t>Any other information free field</a:t>
+            </a:r>
+          </a:p>
+          <a:p>
+            <a:pPr marL="171450" indent="-171450">
+              <a:buFontTx/>
+              <a:buChar char="-"/>
+            </a:pPr>
+            <a:endParaRPr lang="en-US" baseline="0" dirty="0" smtClean="0"/>
+          </a:p>
+          <a:p>
+            <a:pPr marL="0" indent="0">
+              <a:buFontTx/>
+              <a:buNone/>
+            </a:pPr>
+            <a:r>
+              <a:rPr lang="en-US" baseline="0" dirty="0" smtClean="0"/>
+              <a:t>This information can be submitted instantly or store and submitted when internet connection is available.</a:t>
+            </a:r>
             <a:endParaRPr lang="en-US" dirty="0"/>
           </a:p>
         </p:txBody>
@@ -2101,7 +2332,7 @@
           <a:p>
             <a:fld id="{C852EBCA-43E0-8746-ADE2-07FDA1D34571}" type="slidenum">
               <a:rPr lang="en-US" smtClean="0"/>
-              <a:t>16</a:t>
+              <a:t>15</a:t>
             </a:fld>
             <a:endParaRPr lang="en-US"/>
           </a:p>
@@ -2110,7 +2341,7 @@
     </p:spTree>
     <p:extLst>
       <p:ext uri="{BB962C8B-B14F-4D97-AF65-F5344CB8AC3E}">
-        <p14:creationId xmlns:p14="http://schemas.microsoft.com/office/powerpoint/2010/main" val="1565510871"/>
+        <p14:creationId xmlns:p14="http://schemas.microsoft.com/office/powerpoint/2010/main" val="1462002074"/>
       </p:ext>
     </p:extLst>
   </p:cSld>
@@ -5841,380 +6072,6 @@
 </file>
 
 <file path=ppt/slides/slide12.xml><?xml version="1.0" encoding="utf-8"?>
-<p:sld xmlns:a="http://schemas.openxmlformats.org/drawingml/2006/main" xmlns:r="http://schemas.openxmlformats.org/officeDocument/2006/relationships" xmlns:p="http://schemas.openxmlformats.org/presentationml/2006/main" show="0">
-  <p:cSld>
-    <p:spTree>
-      <p:nvGrpSpPr>
-        <p:cNvPr id="1" name=""/>
-        <p:cNvGrpSpPr/>
-        <p:nvPr/>
-      </p:nvGrpSpPr>
-      <p:grpSpPr>
-        <a:xfrm>
-          <a:off x="0" y="0"/>
-          <a:ext cx="0" cy="0"/>
-          <a:chOff x="0" y="0"/>
-          <a:chExt cx="0" cy="0"/>
-        </a:xfrm>
-      </p:grpSpPr>
-      <p:sp>
-        <p:nvSpPr>
-          <p:cNvPr id="2" name="Title 1"/>
-          <p:cNvSpPr>
-            <a:spLocks noGrp="1"/>
-          </p:cNvSpPr>
-          <p:nvPr>
-            <p:ph type="title"/>
-          </p:nvPr>
-        </p:nvSpPr>
-        <p:spPr/>
-        <p:txBody>
-          <a:bodyPr/>
-          <a:lstStyle/>
-          <a:p>
-            <a:r>
-              <a:rPr lang="en-GB" dirty="0" smtClean="0">
-                <a:solidFill>
-                  <a:srgbClr val="FF0000"/>
-                </a:solidFill>
-              </a:rPr>
-              <a:t>Introduction</a:t>
-            </a:r>
-            <a:endParaRPr lang="en-GB" dirty="0">
-              <a:solidFill>
-                <a:srgbClr val="FF0000"/>
-              </a:solidFill>
-            </a:endParaRPr>
-          </a:p>
-        </p:txBody>
-      </p:sp>
-      <p:sp>
-        <p:nvSpPr>
-          <p:cNvPr id="3" name="Content Placeholder 2"/>
-          <p:cNvSpPr>
-            <a:spLocks noGrp="1"/>
-          </p:cNvSpPr>
-          <p:nvPr>
-            <p:ph idx="1"/>
-          </p:nvPr>
-        </p:nvSpPr>
-        <p:spPr/>
-        <p:txBody>
-          <a:bodyPr>
-            <a:normAutofit/>
-          </a:bodyPr>
-          <a:lstStyle/>
-          <a:p>
-            <a:pPr marL="0" indent="0">
-              <a:buNone/>
-            </a:pPr>
-            <a:r>
-              <a:rPr lang="en-GB" sz="2000" dirty="0" smtClean="0">
-                <a:solidFill>
-                  <a:srgbClr val="FF0000"/>
-                </a:solidFill>
-              </a:rPr>
-              <a:t>Our proposal outlines a portal front end on the save the children website to allow reporting violations.</a:t>
-            </a:r>
-          </a:p>
-          <a:p>
-            <a:pPr marL="0" indent="0" algn="ctr">
-              <a:buNone/>
-            </a:pPr>
-            <a:endParaRPr lang="en-GB" sz="2000" dirty="0" smtClean="0">
-              <a:solidFill>
-                <a:srgbClr val="FF0000"/>
-              </a:solidFill>
-            </a:endParaRPr>
-          </a:p>
-          <a:p>
-            <a:pPr marL="0" indent="0">
-              <a:buNone/>
-            </a:pPr>
-            <a:r>
-              <a:rPr lang="en-GB" sz="2000" dirty="0" smtClean="0">
-                <a:solidFill>
-                  <a:srgbClr val="FF0000"/>
-                </a:solidFill>
-              </a:rPr>
-              <a:t>Our idea is to start with a small piece of functionality that can </a:t>
-            </a:r>
-            <a:r>
-              <a:rPr lang="en-GB" sz="2000" dirty="0" err="1" smtClean="0">
-                <a:solidFill>
-                  <a:srgbClr val="FF0000"/>
-                </a:solidFill>
-              </a:rPr>
-              <a:t>eb</a:t>
-            </a:r>
-            <a:r>
-              <a:rPr lang="en-GB" sz="2000" dirty="0" smtClean="0">
-                <a:solidFill>
-                  <a:srgbClr val="FF0000"/>
-                </a:solidFill>
-              </a:rPr>
-              <a:t> implemented quickly and evaluated by real users.  If it is successful the portal can be extended to:</a:t>
-            </a:r>
-          </a:p>
-          <a:p>
-            <a:pPr marL="0" indent="0" algn="ctr">
-              <a:buNone/>
-            </a:pPr>
-            <a:endParaRPr lang="en-GB" sz="2000" dirty="0" smtClean="0">
-              <a:solidFill>
-                <a:srgbClr val="FF0000"/>
-              </a:solidFill>
-            </a:endParaRPr>
-          </a:p>
-          <a:p>
-            <a:r>
-              <a:rPr lang="en-GB" sz="2000" dirty="0" smtClean="0">
-                <a:solidFill>
-                  <a:srgbClr val="FF0000"/>
-                </a:solidFill>
-              </a:rPr>
-              <a:t>Inventory and distribution of donated stock</a:t>
-            </a:r>
-          </a:p>
-          <a:p>
-            <a:r>
-              <a:rPr lang="en-GB" sz="2000" dirty="0" smtClean="0">
-                <a:solidFill>
-                  <a:srgbClr val="FF0000"/>
-                </a:solidFill>
-              </a:rPr>
-              <a:t>Mapping of available stock </a:t>
-            </a:r>
-          </a:p>
-          <a:p>
-            <a:r>
-              <a:rPr lang="en-GB" sz="2000" dirty="0" smtClean="0">
-                <a:solidFill>
-                  <a:srgbClr val="FF0000"/>
-                </a:solidFill>
-              </a:rPr>
-              <a:t>Setting up a donation centre</a:t>
-            </a:r>
-          </a:p>
-          <a:p>
-            <a:r>
-              <a:rPr lang="en-GB" sz="2000" dirty="0" smtClean="0">
-                <a:solidFill>
-                  <a:srgbClr val="FF0000"/>
-                </a:solidFill>
-              </a:rPr>
-              <a:t>View and download information</a:t>
-            </a:r>
-          </a:p>
-          <a:p>
-            <a:endParaRPr lang="en-GB" sz="2000" dirty="0" smtClean="0">
-              <a:solidFill>
-                <a:srgbClr val="FF0000"/>
-              </a:solidFill>
-            </a:endParaRPr>
-          </a:p>
-          <a:p>
-            <a:endParaRPr lang="en-GB" dirty="0"/>
-          </a:p>
-        </p:txBody>
-      </p:sp>
-    </p:spTree>
-    <p:extLst>
-      <p:ext uri="{BB962C8B-B14F-4D97-AF65-F5344CB8AC3E}">
-        <p14:creationId xmlns:p14="http://schemas.microsoft.com/office/powerpoint/2010/main" val="1391943566"/>
-      </p:ext>
-    </p:extLst>
-  </p:cSld>
-  <p:clrMapOvr>
-    <a:masterClrMapping/>
-  </p:clrMapOvr>
-  <mc:AlternateContent xmlns:mc="http://schemas.openxmlformats.org/markup-compatibility/2006">
-    <mc:Choice xmlns:p14="http://schemas.microsoft.com/office/powerpoint/2010/main" Requires="p14">
-      <p:transition spd="slow" p14:dur="2000"/>
-    </mc:Choice>
-    <mc:Fallback>
-      <p:transition xmlns:p14="http://schemas.microsoft.com/office/powerpoint/2010/main" spd="slow"/>
-    </mc:Fallback>
-  </mc:AlternateContent>
-  <p:timing>
-    <p:tnLst>
-      <p:par>
-        <p:cTn xmlns:p14="http://schemas.microsoft.com/office/powerpoint/2010/main" id="1" dur="indefinite" restart="never" nodeType="tmRoot"/>
-      </p:par>
-    </p:tnLst>
-  </p:timing>
-</p:sld>
-</file>
-
-<file path=ppt/slides/slide13.xml><?xml version="1.0" encoding="utf-8"?>
-<p:sld xmlns:a="http://schemas.openxmlformats.org/drawingml/2006/main" xmlns:r="http://schemas.openxmlformats.org/officeDocument/2006/relationships" xmlns:p="http://schemas.openxmlformats.org/presentationml/2006/main" show="0">
-  <p:cSld>
-    <p:spTree>
-      <p:nvGrpSpPr>
-        <p:cNvPr id="1" name=""/>
-        <p:cNvGrpSpPr/>
-        <p:nvPr/>
-      </p:nvGrpSpPr>
-      <p:grpSpPr>
-        <a:xfrm>
-          <a:off x="0" y="0"/>
-          <a:ext cx="0" cy="0"/>
-          <a:chOff x="0" y="0"/>
-          <a:chExt cx="0" cy="0"/>
-        </a:xfrm>
-      </p:grpSpPr>
-      <p:sp>
-        <p:nvSpPr>
-          <p:cNvPr id="2" name="Title 1"/>
-          <p:cNvSpPr>
-            <a:spLocks noGrp="1"/>
-          </p:cNvSpPr>
-          <p:nvPr>
-            <p:ph type="ctrTitle"/>
-          </p:nvPr>
-        </p:nvSpPr>
-        <p:spPr/>
-        <p:txBody>
-          <a:bodyPr/>
-          <a:lstStyle/>
-          <a:p>
-            <a:endParaRPr lang="en-GB" dirty="0"/>
-          </a:p>
-        </p:txBody>
-      </p:sp>
-      <p:sp>
-        <p:nvSpPr>
-          <p:cNvPr id="3" name="Subtitle 2"/>
-          <p:cNvSpPr>
-            <a:spLocks noGrp="1"/>
-          </p:cNvSpPr>
-          <p:nvPr>
-            <p:ph type="subTitle" idx="1"/>
-          </p:nvPr>
-        </p:nvSpPr>
-        <p:spPr/>
-        <p:txBody>
-          <a:bodyPr/>
-          <a:lstStyle/>
-          <a:p>
-            <a:endParaRPr lang="en-GB"/>
-          </a:p>
-        </p:txBody>
-      </p:sp>
-      <p:pic>
-        <p:nvPicPr>
-          <p:cNvPr id="1029" name="Picture 5"/>
-          <p:cNvPicPr>
-            <a:picLocks noChangeAspect="1" noChangeArrowheads="1"/>
-          </p:cNvPicPr>
-          <p:nvPr/>
-        </p:nvPicPr>
-        <p:blipFill>
-          <a:blip r:embed="rId2">
-            <a:extLst>
-              <a:ext uri="{28A0092B-C50C-407E-A947-70E740481C1C}">
-                <a14:useLocalDpi xmlns:a14="http://schemas.microsoft.com/office/drawing/2010/main" val="0"/>
-              </a:ext>
-            </a:extLst>
-          </a:blip>
-          <a:srcRect/>
-          <a:stretch>
-            <a:fillRect/>
-          </a:stretch>
-        </p:blipFill>
-        <p:spPr bwMode="auto">
-          <a:xfrm>
-            <a:off x="-180528" y="0"/>
-            <a:ext cx="9451340" cy="6858000"/>
-          </a:xfrm>
-          <a:prstGeom prst="rect">
-            <a:avLst/>
-          </a:prstGeom>
-          <a:solidFill>
-            <a:srgbClr val="FF0000"/>
-          </a:solidFill>
-          <a:ln>
-            <a:noFill/>
-          </a:ln>
-        </p:spPr>
-      </p:pic>
-      <p:sp>
-        <p:nvSpPr>
-          <p:cNvPr id="4" name="Rectangle 3"/>
-          <p:cNvSpPr/>
-          <p:nvPr/>
-        </p:nvSpPr>
-        <p:spPr>
-          <a:xfrm>
-            <a:off x="4716016" y="2197621"/>
-            <a:ext cx="792088" cy="216024"/>
-          </a:xfrm>
-          <a:prstGeom prst="rect">
-            <a:avLst/>
-          </a:prstGeom>
-        </p:spPr>
-        <p:style>
-          <a:lnRef idx="2">
-            <a:schemeClr val="accent1">
-              <a:shade val="50000"/>
-            </a:schemeClr>
-          </a:lnRef>
-          <a:fillRef idx="1">
-            <a:schemeClr val="accent1"/>
-          </a:fillRef>
-          <a:effectRef idx="0">
-            <a:schemeClr val="accent1"/>
-          </a:effectRef>
-          <a:fontRef idx="minor">
-            <a:schemeClr val="lt1"/>
-          </a:fontRef>
-        </p:style>
-        <p:txBody>
-          <a:bodyPr rtlCol="0" anchor="ctr"/>
-          <a:lstStyle/>
-          <a:p>
-            <a:pPr algn="ctr"/>
-            <a:r>
-              <a:rPr lang="en-GB" sz="1100" dirty="0" smtClean="0">
-                <a:latin typeface="Georgia"/>
-              </a:rPr>
-              <a:t>STC Portal</a:t>
-            </a:r>
-            <a:endParaRPr lang="en-GB" dirty="0">
-              <a:latin typeface="Georgia"/>
-            </a:endParaRPr>
-          </a:p>
-        </p:txBody>
-      </p:sp>
-    </p:spTree>
-    <p:extLst>
-      <p:ext uri="{BB962C8B-B14F-4D97-AF65-F5344CB8AC3E}">
-        <p14:creationId xmlns:p14="http://schemas.microsoft.com/office/powerpoint/2010/main" val="3187080682"/>
-      </p:ext>
-    </p:extLst>
-  </p:cSld>
-  <p:clrMapOvr>
-    <a:masterClrMapping/>
-  </p:clrMapOvr>
-  <mc:AlternateContent xmlns:mc="http://schemas.openxmlformats.org/markup-compatibility/2006">
-    <mc:Choice xmlns:p14="http://schemas.microsoft.com/office/powerpoint/2010/main" Requires="p14">
-      <p:transition spd="slow" p14:dur="2000"/>
-    </mc:Choice>
-    <mc:Fallback>
-      <p:transition xmlns:p14="http://schemas.microsoft.com/office/powerpoint/2010/main" spd="slow"/>
-    </mc:Fallback>
-  </mc:AlternateContent>
-  <p:timing>
-    <p:tnLst>
-      <p:par>
-        <p:cTn xmlns:p14="http://schemas.microsoft.com/office/powerpoint/2010/main" id="1" dur="indefinite" restart="never" nodeType="tmRoot"/>
-      </p:par>
-    </p:tnLst>
-  </p:timing>
-</p:sld>
-</file>
-
-<file path=ppt/slides/slide14.xml><?xml version="1.0" encoding="utf-8"?>
 <p:sld xmlns:a="http://schemas.openxmlformats.org/drawingml/2006/main" xmlns:r="http://schemas.openxmlformats.org/officeDocument/2006/relationships" xmlns:p="http://schemas.openxmlformats.org/presentationml/2006/main">
   <p:cSld>
     <p:spTree>
@@ -6299,7 +6156,7 @@
 </p:sld>
 </file>
 
-<file path=ppt/slides/slide15.xml><?xml version="1.0" encoding="utf-8"?>
+<file path=ppt/slides/slide13.xml><?xml version="1.0" encoding="utf-8"?>
 <p:sld xmlns:a="http://schemas.openxmlformats.org/drawingml/2006/main" xmlns:r="http://schemas.openxmlformats.org/officeDocument/2006/relationships" xmlns:p="http://schemas.openxmlformats.org/presentationml/2006/main">
   <p:cSld>
     <p:spTree>
@@ -6391,242 +6248,7 @@
 </p:sld>
 </file>
 
-<file path=ppt/slides/slide16.xml><?xml version="1.0" encoding="utf-8"?>
-<p:sld xmlns:a="http://schemas.openxmlformats.org/drawingml/2006/main" xmlns:r="http://schemas.openxmlformats.org/officeDocument/2006/relationships" xmlns:p="http://schemas.openxmlformats.org/presentationml/2006/main" show="0">
-  <p:cSld>
-    <p:spTree>
-      <p:nvGrpSpPr>
-        <p:cNvPr id="1" name=""/>
-        <p:cNvGrpSpPr/>
-        <p:nvPr/>
-      </p:nvGrpSpPr>
-      <p:grpSpPr>
-        <a:xfrm>
-          <a:off x="0" y="0"/>
-          <a:ext cx="0" cy="0"/>
-          <a:chOff x="0" y="0"/>
-          <a:chExt cx="0" cy="0"/>
-        </a:xfrm>
-      </p:grpSpPr>
-      <p:sp>
-        <p:nvSpPr>
-          <p:cNvPr id="2" name="Title 1"/>
-          <p:cNvSpPr>
-            <a:spLocks noGrp="1"/>
-          </p:cNvSpPr>
-          <p:nvPr>
-            <p:ph type="title"/>
-          </p:nvPr>
-        </p:nvSpPr>
-        <p:spPr/>
-        <p:txBody>
-          <a:bodyPr>
-            <a:normAutofit fontScale="90000"/>
-          </a:bodyPr>
-          <a:lstStyle/>
-          <a:p>
-            <a:r>
-              <a:rPr lang="en-GB" dirty="0">
-                <a:solidFill>
-                  <a:srgbClr val="FF0000"/>
-                </a:solidFill>
-              </a:rPr>
-              <a:t>Save the Children Portal Page</a:t>
-            </a:r>
-            <a:endParaRPr lang="en-GB" dirty="0"/>
-          </a:p>
-        </p:txBody>
-      </p:sp>
-      <p:sp>
-        <p:nvSpPr>
-          <p:cNvPr id="3" name="Content Placeholder 2"/>
-          <p:cNvSpPr>
-            <a:spLocks noGrp="1"/>
-          </p:cNvSpPr>
-          <p:nvPr>
-            <p:ph idx="1"/>
-          </p:nvPr>
-        </p:nvSpPr>
-        <p:spPr/>
-        <p:txBody>
-          <a:bodyPr>
-            <a:normAutofit lnSpcReduction="10000"/>
-          </a:bodyPr>
-          <a:lstStyle/>
-          <a:p>
-            <a:pPr marL="0" lvl="0" indent="0" algn="ctr">
-              <a:buNone/>
-            </a:pPr>
-            <a:r>
-              <a:rPr lang="en-GB" sz="2000" dirty="0" smtClean="0">
-                <a:solidFill>
-                  <a:srgbClr val="FF0000"/>
-                </a:solidFill>
-              </a:rPr>
-              <a:t>Report a violation questionnaire</a:t>
-            </a:r>
-          </a:p>
-          <a:p>
-            <a:pPr lvl="0"/>
-            <a:endParaRPr lang="en-GB" sz="2000" dirty="0" smtClean="0">
-              <a:solidFill>
-                <a:srgbClr val="FF0000"/>
-              </a:solidFill>
-            </a:endParaRPr>
-          </a:p>
-          <a:p>
-            <a:pPr lvl="0"/>
-            <a:r>
-              <a:rPr lang="en-GB" sz="2000" dirty="0" smtClean="0">
-                <a:solidFill>
-                  <a:srgbClr val="FF0000"/>
-                </a:solidFill>
-              </a:rPr>
-              <a:t>Are </a:t>
-            </a:r>
-            <a:r>
-              <a:rPr lang="en-GB" sz="2000" dirty="0">
-                <a:solidFill>
-                  <a:srgbClr val="FF0000"/>
-                </a:solidFill>
-              </a:rPr>
-              <a:t>free samples or feeding equipment being handed out?  </a:t>
-            </a:r>
-          </a:p>
-          <a:p>
-            <a:pPr lvl="0"/>
-            <a:r>
-              <a:rPr lang="en-GB" sz="2000" dirty="0">
-                <a:solidFill>
-                  <a:srgbClr val="FF0000"/>
-                </a:solidFill>
-              </a:rPr>
-              <a:t>Are company reps receiving bonuses related to sales?</a:t>
-            </a:r>
-          </a:p>
-          <a:p>
-            <a:pPr lvl="0"/>
-            <a:r>
-              <a:rPr lang="en-GB" sz="2000" dirty="0">
-                <a:solidFill>
-                  <a:srgbClr val="FF0000"/>
-                </a:solidFill>
-              </a:rPr>
-              <a:t>Is the baby formula being advertised?</a:t>
-            </a:r>
-          </a:p>
-          <a:p>
-            <a:pPr lvl="0"/>
-            <a:r>
-              <a:rPr lang="en-GB" sz="2000" dirty="0">
-                <a:solidFill>
-                  <a:srgbClr val="FF0000"/>
-                </a:solidFill>
-              </a:rPr>
-              <a:t>Is this being recommended as an alternative to breast feeding?</a:t>
-            </a:r>
-          </a:p>
-          <a:p>
-            <a:pPr lvl="0"/>
-            <a:r>
-              <a:rPr lang="en-GB" sz="2000" dirty="0">
-                <a:solidFill>
-                  <a:srgbClr val="FF0000"/>
-                </a:solidFill>
-              </a:rPr>
-              <a:t>Is breast feeding being discouraged?</a:t>
-            </a:r>
-          </a:p>
-          <a:p>
-            <a:pPr lvl="0"/>
-            <a:r>
-              <a:rPr lang="en-GB" sz="2000" dirty="0">
-                <a:solidFill>
-                  <a:srgbClr val="FF0000"/>
-                </a:solidFill>
-              </a:rPr>
-              <a:t>Are company reps contacting mothers and families directly?</a:t>
-            </a:r>
-          </a:p>
-          <a:p>
-            <a:pPr lvl="0"/>
-            <a:r>
-              <a:rPr lang="en-GB" sz="2000" dirty="0">
-                <a:solidFill>
-                  <a:srgbClr val="FF0000"/>
-                </a:solidFill>
-              </a:rPr>
-              <a:t>Have the donations been requested by the government</a:t>
-            </a:r>
-            <a:r>
-              <a:rPr lang="en-GB" sz="2000" dirty="0" smtClean="0">
-                <a:solidFill>
-                  <a:srgbClr val="FF0000"/>
-                </a:solidFill>
-              </a:rPr>
-              <a:t>?</a:t>
-            </a:r>
-          </a:p>
-          <a:p>
-            <a:pPr lvl="0"/>
-            <a:endParaRPr lang="en-GB" sz="2000" dirty="0">
-              <a:solidFill>
-                <a:srgbClr val="FF0000"/>
-              </a:solidFill>
-            </a:endParaRPr>
-          </a:p>
-          <a:p>
-            <a:pPr marL="0" lvl="0" indent="0" algn="ctr">
-              <a:buNone/>
-            </a:pPr>
-            <a:r>
-              <a:rPr lang="en-GB" sz="2000" dirty="0" smtClean="0">
-                <a:solidFill>
-                  <a:srgbClr val="FF0000"/>
-                </a:solidFill>
-              </a:rPr>
-              <a:t>(see an example showing [YES] answered question)</a:t>
-            </a:r>
-            <a:endParaRPr lang="en-GB" sz="2000" dirty="0">
-              <a:solidFill>
-                <a:srgbClr val="FF0000"/>
-              </a:solidFill>
-            </a:endParaRPr>
-          </a:p>
-          <a:p>
-            <a:endParaRPr lang="en-GB" dirty="0"/>
-          </a:p>
-        </p:txBody>
-      </p:sp>
-    </p:spTree>
-    <p:extLst>
-      <p:ext uri="{BB962C8B-B14F-4D97-AF65-F5344CB8AC3E}">
-        <p14:creationId xmlns:p14="http://schemas.microsoft.com/office/powerpoint/2010/main" val="281107325"/>
-      </p:ext>
-    </p:extLst>
-  </p:cSld>
-  <p:clrMapOvr>
-    <a:masterClrMapping/>
-  </p:clrMapOvr>
-  <mc:AlternateContent xmlns:mc="http://schemas.openxmlformats.org/markup-compatibility/2006">
-    <mc:Choice xmlns:p14="http://schemas.microsoft.com/office/powerpoint/2010/main" Requires="p14">
-      <p:transition spd="slow" p14:dur="2000"/>
-    </mc:Choice>
-    <mc:Fallback>
-      <p:transition xmlns:p14="http://schemas.microsoft.com/office/powerpoint/2010/main" spd="slow"/>
-    </mc:Fallback>
-  </mc:AlternateContent>
-  <p:timing>
-    <p:tnLst>
-      <p:par>
-        <p:cTn xmlns:p14="http://schemas.microsoft.com/office/powerpoint/2010/main" id="1" dur="indefinite" restart="never" nodeType="tmRoot"/>
-      </p:par>
-    </p:tnLst>
-  </p:timing>
-</p:sld>
-</file>
-
-<file path=ppt/slides/slide17.xml><?xml version="1.0" encoding="utf-8"?>
+<file path=ppt/slides/slide14.xml><?xml version="1.0" encoding="utf-8"?>
 <p:sld xmlns:a="http://schemas.openxmlformats.org/drawingml/2006/main" xmlns:r="http://schemas.openxmlformats.org/officeDocument/2006/relationships" xmlns:p="http://schemas.openxmlformats.org/presentationml/2006/main">
   <p:cSld>
     <p:spTree>
@@ -6713,7 +6335,7 @@
 </p:sld>
 </file>
 
-<file path=ppt/slides/slide18.xml><?xml version="1.0" encoding="utf-8"?>
+<file path=ppt/slides/slide15.xml><?xml version="1.0" encoding="utf-8"?>
 <p:sld xmlns:a="http://schemas.openxmlformats.org/drawingml/2006/main" xmlns:r="http://schemas.openxmlformats.org/officeDocument/2006/relationships" xmlns:p="http://schemas.openxmlformats.org/presentationml/2006/main">
   <p:cSld>
     <p:spTree>
@@ -6800,7 +6422,7 @@
 </p:sld>
 </file>
 
-<file path=ppt/slides/slide19.xml><?xml version="1.0" encoding="utf-8"?>
+<file path=ppt/slides/slide16.xml><?xml version="1.0" encoding="utf-8"?>
 <p:sld xmlns:a="http://schemas.openxmlformats.org/drawingml/2006/main" xmlns:r="http://schemas.openxmlformats.org/officeDocument/2006/relationships" xmlns:p="http://schemas.openxmlformats.org/presentationml/2006/main">
   <p:cSld>
     <p:spTree>
@@ -6923,6 +6545,319 @@
 </p:sld>
 </file>
 
+<file path=ppt/slides/slide17.xml><?xml version="1.0" encoding="utf-8"?>
+<p:sld xmlns:a="http://schemas.openxmlformats.org/drawingml/2006/main" xmlns:r="http://schemas.openxmlformats.org/officeDocument/2006/relationships" xmlns:p="http://schemas.openxmlformats.org/presentationml/2006/main">
+  <p:cSld>
+    <p:spTree>
+      <p:nvGrpSpPr>
+        <p:cNvPr id="1" name=""/>
+        <p:cNvGrpSpPr/>
+        <p:nvPr/>
+      </p:nvGrpSpPr>
+      <p:grpSpPr>
+        <a:xfrm>
+          <a:off x="0" y="0"/>
+          <a:ext cx="0" cy="0"/>
+          <a:chOff x="0" y="0"/>
+          <a:chExt cx="0" cy="0"/>
+        </a:xfrm>
+      </p:grpSpPr>
+      <p:sp>
+        <p:nvSpPr>
+          <p:cNvPr id="2" name="Title 1"/>
+          <p:cNvSpPr>
+            <a:spLocks noGrp="1"/>
+          </p:cNvSpPr>
+          <p:nvPr>
+            <p:ph type="title"/>
+          </p:nvPr>
+        </p:nvSpPr>
+        <p:spPr/>
+        <p:txBody>
+          <a:bodyPr/>
+          <a:lstStyle/>
+          <a:p>
+            <a:r>
+              <a:rPr lang="en-US" dirty="0" smtClean="0"/>
+              <a:t>Reports administration</a:t>
+            </a:r>
+            <a:endParaRPr lang="en-US" dirty="0"/>
+          </a:p>
+        </p:txBody>
+      </p:sp>
+      <p:sp>
+        <p:nvSpPr>
+          <p:cNvPr id="3" name="Content Placeholder 2"/>
+          <p:cNvSpPr>
+            <a:spLocks noGrp="1"/>
+          </p:cNvSpPr>
+          <p:nvPr>
+            <p:ph idx="1"/>
+          </p:nvPr>
+        </p:nvSpPr>
+        <p:spPr/>
+        <p:txBody>
+          <a:bodyPr/>
+          <a:lstStyle/>
+          <a:p>
+            <a:pPr marL="0" indent="0">
+              <a:buNone/>
+            </a:pPr>
+            <a:r>
+              <a:rPr lang="en-US" dirty="0" smtClean="0"/>
+              <a:t>The reporting capability will generate a lot of data. This will have to be processed to filter and highlight the most important of the reports.</a:t>
+            </a:r>
+          </a:p>
+          <a:p>
+            <a:pPr marL="0" indent="0">
+              <a:buNone/>
+            </a:pPr>
+            <a:r>
+              <a:rPr lang="en-US" dirty="0" smtClean="0"/>
+              <a:t>For this we propose two stages review:</a:t>
+            </a:r>
+          </a:p>
+          <a:p>
+            <a:r>
+              <a:rPr lang="en-US" dirty="0" smtClean="0"/>
+              <a:t>System scoring</a:t>
+            </a:r>
+          </a:p>
+          <a:p>
+            <a:r>
+              <a:rPr lang="en-US" dirty="0" smtClean="0"/>
+              <a:t>Manual review</a:t>
+            </a:r>
+            <a:endParaRPr lang="en-US" dirty="0"/>
+          </a:p>
+        </p:txBody>
+      </p:sp>
+    </p:spTree>
+    <p:extLst>
+      <p:ext uri="{BB962C8B-B14F-4D97-AF65-F5344CB8AC3E}">
+        <p14:creationId xmlns:p14="http://schemas.microsoft.com/office/powerpoint/2010/main" val="2364891170"/>
+      </p:ext>
+    </p:extLst>
+  </p:cSld>
+  <p:clrMapOvr>
+    <a:masterClrMapping/>
+  </p:clrMapOvr>
+</p:sld>
+</file>
+
+<file path=ppt/slides/slide18.xml><?xml version="1.0" encoding="utf-8"?>
+<p:sld xmlns:a="http://schemas.openxmlformats.org/drawingml/2006/main" xmlns:r="http://schemas.openxmlformats.org/officeDocument/2006/relationships" xmlns:p="http://schemas.openxmlformats.org/presentationml/2006/main">
+  <p:cSld>
+    <p:spTree>
+      <p:nvGrpSpPr>
+        <p:cNvPr id="1" name=""/>
+        <p:cNvGrpSpPr/>
+        <p:nvPr/>
+      </p:nvGrpSpPr>
+      <p:grpSpPr>
+        <a:xfrm>
+          <a:off x="0" y="0"/>
+          <a:ext cx="0" cy="0"/>
+          <a:chOff x="0" y="0"/>
+          <a:chExt cx="0" cy="0"/>
+        </a:xfrm>
+      </p:grpSpPr>
+      <p:sp>
+        <p:nvSpPr>
+          <p:cNvPr id="2" name="Title 1"/>
+          <p:cNvSpPr>
+            <a:spLocks noGrp="1"/>
+          </p:cNvSpPr>
+          <p:nvPr>
+            <p:ph type="title"/>
+          </p:nvPr>
+        </p:nvSpPr>
+        <p:spPr/>
+        <p:txBody>
+          <a:bodyPr>
+            <a:normAutofit/>
+          </a:bodyPr>
+          <a:lstStyle/>
+          <a:p>
+            <a:r>
+              <a:rPr lang="en-US" sz="4000" dirty="0" smtClean="0"/>
+              <a:t>Reports administration – system scoring</a:t>
+            </a:r>
+            <a:endParaRPr lang="en-US" sz="4000" dirty="0"/>
+          </a:p>
+        </p:txBody>
+      </p:sp>
+      <p:sp>
+        <p:nvSpPr>
+          <p:cNvPr id="3" name="Content Placeholder 2"/>
+          <p:cNvSpPr>
+            <a:spLocks noGrp="1"/>
+          </p:cNvSpPr>
+          <p:nvPr>
+            <p:ph idx="1"/>
+          </p:nvPr>
+        </p:nvSpPr>
+        <p:spPr/>
+        <p:txBody>
+          <a:bodyPr/>
+          <a:lstStyle/>
+          <a:p>
+            <a:pPr marL="0" indent="0">
+              <a:buNone/>
+            </a:pPr>
+            <a:r>
+              <a:rPr lang="en-US" dirty="0" smtClean="0"/>
+              <a:t>The system will be able to assign a credibility score to a report based on the number of factors:</a:t>
+            </a:r>
+          </a:p>
+          <a:p>
+            <a:r>
+              <a:rPr lang="en-US" dirty="0" smtClean="0"/>
+              <a:t>Reporter’s previous activity</a:t>
+            </a:r>
+          </a:p>
+          <a:p>
+            <a:r>
+              <a:rPr lang="en-US" dirty="0" smtClean="0"/>
+              <a:t>New or existing (with history) reporter</a:t>
+            </a:r>
+          </a:p>
+          <a:p>
+            <a:r>
+              <a:rPr lang="en-US" dirty="0" smtClean="0"/>
+              <a:t>Reporter’s occupation</a:t>
+            </a:r>
+          </a:p>
+          <a:p>
+            <a:r>
+              <a:rPr lang="en-US" dirty="0" smtClean="0"/>
+              <a:t>Hard details (pictures, </a:t>
+            </a:r>
+            <a:r>
+              <a:rPr lang="en-US" dirty="0" err="1" smtClean="0"/>
+              <a:t>gps</a:t>
+            </a:r>
+            <a:r>
+              <a:rPr lang="en-US" dirty="0" smtClean="0"/>
+              <a:t> coordinates)</a:t>
+            </a:r>
+          </a:p>
+          <a:p>
+            <a:r>
+              <a:rPr lang="en-US" dirty="0" smtClean="0"/>
+              <a:t>…any other</a:t>
+            </a:r>
+          </a:p>
+          <a:p>
+            <a:pPr marL="0" indent="0">
+              <a:buNone/>
+            </a:pPr>
+            <a:r>
+              <a:rPr lang="en-US" dirty="0" smtClean="0"/>
+              <a:t>The reports will be listed in an admin console with this score attached.</a:t>
+            </a:r>
+          </a:p>
+          <a:p>
+            <a:endParaRPr lang="en-US" dirty="0"/>
+          </a:p>
+        </p:txBody>
+      </p:sp>
+    </p:spTree>
+    <p:extLst>
+      <p:ext uri="{BB962C8B-B14F-4D97-AF65-F5344CB8AC3E}">
+        <p14:creationId xmlns:p14="http://schemas.microsoft.com/office/powerpoint/2010/main" val="200930542"/>
+      </p:ext>
+    </p:extLst>
+  </p:cSld>
+  <p:clrMapOvr>
+    <a:masterClrMapping/>
+  </p:clrMapOvr>
+</p:sld>
+</file>
+
+<file path=ppt/slides/slide19.xml><?xml version="1.0" encoding="utf-8"?>
+<p:sld xmlns:a="http://schemas.openxmlformats.org/drawingml/2006/main" xmlns:r="http://schemas.openxmlformats.org/officeDocument/2006/relationships" xmlns:p="http://schemas.openxmlformats.org/presentationml/2006/main">
+  <p:cSld>
+    <p:spTree>
+      <p:nvGrpSpPr>
+        <p:cNvPr id="1" name=""/>
+        <p:cNvGrpSpPr/>
+        <p:nvPr/>
+      </p:nvGrpSpPr>
+      <p:grpSpPr>
+        <a:xfrm>
+          <a:off x="0" y="0"/>
+          <a:ext cx="0" cy="0"/>
+          <a:chOff x="0" y="0"/>
+          <a:chExt cx="0" cy="0"/>
+        </a:xfrm>
+      </p:grpSpPr>
+      <p:sp>
+        <p:nvSpPr>
+          <p:cNvPr id="2" name="Title 1"/>
+          <p:cNvSpPr>
+            <a:spLocks noGrp="1"/>
+          </p:cNvSpPr>
+          <p:nvPr>
+            <p:ph type="title"/>
+          </p:nvPr>
+        </p:nvSpPr>
+        <p:spPr/>
+        <p:txBody>
+          <a:bodyPr>
+            <a:normAutofit/>
+          </a:bodyPr>
+          <a:lstStyle/>
+          <a:p>
+            <a:r>
+              <a:rPr lang="en-US" sz="4000" dirty="0" smtClean="0"/>
+              <a:t>Reports administration – manual review</a:t>
+            </a:r>
+            <a:endParaRPr lang="en-US" sz="4000" dirty="0"/>
+          </a:p>
+        </p:txBody>
+      </p:sp>
+      <p:sp>
+        <p:nvSpPr>
+          <p:cNvPr id="3" name="Content Placeholder 2"/>
+          <p:cNvSpPr>
+            <a:spLocks noGrp="1"/>
+          </p:cNvSpPr>
+          <p:nvPr>
+            <p:ph idx="1"/>
+          </p:nvPr>
+        </p:nvSpPr>
+        <p:spPr/>
+        <p:txBody>
+          <a:bodyPr/>
+          <a:lstStyle/>
+          <a:p>
+            <a:pPr marL="0" indent="0">
+              <a:buNone/>
+            </a:pPr>
+            <a:r>
+              <a:rPr lang="en-US" dirty="0" smtClean="0"/>
+              <a:t>An administrator or someone entitled to review the reports will be able to login into the STC Portal and review and action the reports.</a:t>
+            </a:r>
+          </a:p>
+          <a:p>
+            <a:endParaRPr lang="en-US" dirty="0"/>
+          </a:p>
+        </p:txBody>
+      </p:sp>
+    </p:spTree>
+    <p:extLst>
+      <p:ext uri="{BB962C8B-B14F-4D97-AF65-F5344CB8AC3E}">
+        <p14:creationId xmlns:p14="http://schemas.microsoft.com/office/powerpoint/2010/main" val="980752186"/>
+      </p:ext>
+    </p:extLst>
+  </p:cSld>
+  <p:clrMapOvr>
+    <a:masterClrMapping/>
+  </p:clrMapOvr>
+</p:sld>
+</file>
+
 <file path=ppt/slides/slide2.xml><?xml version="1.0" encoding="utf-8"?>
 <p:sld xmlns:a="http://schemas.openxmlformats.org/drawingml/2006/main" xmlns:r="http://schemas.openxmlformats.org/officeDocument/2006/relationships" xmlns:p="http://schemas.openxmlformats.org/presentationml/2006/main">
   <p:cSld>
@@ -7048,7 +6983,7 @@
 </file>
 
 <file path=ppt/slides/slide20.xml><?xml version="1.0" encoding="utf-8"?>
-<p:sld xmlns:a="http://schemas.openxmlformats.org/drawingml/2006/main" xmlns:r="http://schemas.openxmlformats.org/officeDocument/2006/relationships" xmlns:p="http://schemas.openxmlformats.org/presentationml/2006/main" show="0">
+<p:sld xmlns:a="http://schemas.openxmlformats.org/drawingml/2006/main" xmlns:r="http://schemas.openxmlformats.org/officeDocument/2006/relationships" xmlns:p="http://schemas.openxmlformats.org/presentationml/2006/main">
   <p:cSld>
     <p:spTree>
       <p:nvGrpSpPr>
@@ -7074,109 +7009,74 @@
             <p:ph type="title"/>
           </p:nvPr>
         </p:nvSpPr>
-        <p:spPr/>
+        <p:spPr>
+          <a:xfrm>
+            <a:off x="762000" y="5164666"/>
+            <a:ext cx="6781800" cy="1007533"/>
+          </a:xfrm>
+        </p:spPr>
         <p:txBody>
           <a:bodyPr>
-            <a:normAutofit fontScale="90000"/>
+            <a:noAutofit/>
           </a:bodyPr>
           <a:lstStyle/>
           <a:p>
             <a:r>
-              <a:rPr lang="en-GB" dirty="0" smtClean="0">
-                <a:solidFill>
-                  <a:srgbClr val="FF0000"/>
-                </a:solidFill>
-              </a:rPr>
-              <a:t>Flow chart on how to report a violation</a:t>
-            </a:r>
-            <a:endParaRPr lang="en-GB" dirty="0"/>
+              <a:rPr lang="en-US" sz="3200" dirty="0"/>
+              <a:t>Reports administration – </a:t>
+            </a:r>
+            <a:r>
+              <a:rPr lang="en-GB" sz="3200" dirty="0"/>
+              <a:t>view suspected </a:t>
+            </a:r>
+            <a:r>
+              <a:rPr lang="en-GB" sz="3200" dirty="0" smtClean="0"/>
+              <a:t>violations reports</a:t>
+            </a:r>
+            <a:endParaRPr lang="en-US" sz="3200" dirty="0"/>
           </a:p>
         </p:txBody>
       </p:sp>
       <p:pic>
         <p:nvPicPr>
-          <p:cNvPr id="1027" name="Picture 3"/>
+          <p:cNvPr id="6" name="Content Placeholder 5" descr="ReportList.png"/>
           <p:cNvPicPr>
-            <a:picLocks noChangeAspect="1" noChangeArrowheads="1"/>
+            <a:picLocks noGrp="1" noChangeAspect="1"/>
           </p:cNvPicPr>
-          <p:nvPr/>
+          <p:nvPr>
+            <p:ph idx="1"/>
+          </p:nvPr>
         </p:nvPicPr>
         <p:blipFill>
-          <a:blip r:embed="rId2">
+          <a:blip r:embed="rId3">
             <a:extLst>
               <a:ext uri="{28A0092B-C50C-407E-A947-70E740481C1C}">
                 <a14:useLocalDpi xmlns:a14="http://schemas.microsoft.com/office/drawing/2010/main" val="0"/>
               </a:ext>
             </a:extLst>
           </a:blip>
-          <a:srcRect/>
+          <a:srcRect l="-22182" r="-22182"/>
           <a:stretch>
             <a:fillRect/>
           </a:stretch>
         </p:blipFill>
-        <p:spPr bwMode="auto">
-          <a:xfrm>
-            <a:off x="1835696" y="1556792"/>
-            <a:ext cx="5025752" cy="4593851"/>
-          </a:xfrm>
-          <a:prstGeom prst="rect">
-            <a:avLst/>
-          </a:prstGeom>
-          <a:noFill/>
-          <a:ln>
-            <a:noFill/>
-          </a:ln>
-          <a:extLst>
-            <a:ext uri="{909E8E84-426E-40dd-AFC4-6F175D3DCCD1}">
-              <a14:hiddenFill xmlns:a14="http://schemas.microsoft.com/office/drawing/2010/main">
-                <a:solidFill>
-                  <a:schemeClr val="accent1"/>
-                </a:solidFill>
-              </a14:hiddenFill>
-            </a:ext>
-            <a:ext uri="{91240B29-F687-4f45-9708-019B960494DF}">
-              <a14:hiddenLine xmlns:a14="http://schemas.microsoft.com/office/drawing/2010/main" w="9525">
-                <a:solidFill>
-                  <a:schemeClr val="tx1"/>
-                </a:solidFill>
-                <a:miter lim="800000"/>
-                <a:headEnd/>
-                <a:tailEnd/>
-              </a14:hiddenLine>
-            </a:ext>
-          </a:extLst>
-        </p:spPr>
+        <p:spPr/>
       </p:pic>
     </p:spTree>
     <p:extLst>
       <p:ext uri="{BB962C8B-B14F-4D97-AF65-F5344CB8AC3E}">
-        <p14:creationId xmlns:p14="http://schemas.microsoft.com/office/powerpoint/2010/main" val="549123957"/>
+        <p14:creationId xmlns:p14="http://schemas.microsoft.com/office/powerpoint/2010/main" val="1901231383"/>
       </p:ext>
     </p:extLst>
   </p:cSld>
   <p:clrMapOvr>
     <a:masterClrMapping/>
   </p:clrMapOvr>
-  <mc:AlternateContent xmlns:mc="http://schemas.openxmlformats.org/markup-compatibility/2006">
-    <mc:Choice xmlns:p14="http://schemas.microsoft.com/office/powerpoint/2010/main" Requires="p14">
-      <p:transition spd="slow" p14:dur="2000"/>
-    </mc:Choice>
-    <mc:Fallback>
-      <p:transition xmlns:p14="http://schemas.microsoft.com/office/powerpoint/2010/main" spd="slow"/>
-    </mc:Fallback>
-  </mc:AlternateContent>
-  <p:timing>
-    <p:tnLst>
-      <p:par>
-        <p:cTn xmlns:p14="http://schemas.microsoft.com/office/powerpoint/2010/main" id="1" dur="indefinite" restart="never" nodeType="tmRoot"/>
-      </p:par>
-    </p:tnLst>
-  </p:timing>
 </p:sld>
 </file>
 
 <file path=ppt/slides/slide21.xml><?xml version="1.0" encoding="utf-8"?>
-<p:sld xmlns:a="http://schemas.openxmlformats.org/drawingml/2006/main" xmlns:r="http://schemas.openxmlformats.org/officeDocument/2006/relationships" xmlns:p="http://schemas.openxmlformats.org/presentationml/2006/main" show="0">
+<p:sld xmlns:a="http://schemas.openxmlformats.org/drawingml/2006/main" xmlns:r="http://schemas.openxmlformats.org/officeDocument/2006/relationships" xmlns:p="http://schemas.openxmlformats.org/presentationml/2006/main">
   <p:cSld>
     <p:spTree>
       <p:nvGrpSpPr>
@@ -7204,86 +7104,62 @@
         </p:nvSpPr>
         <p:spPr/>
         <p:txBody>
-          <a:bodyPr/>
-          <a:lstStyle/>
-          <a:p>
-            <a:r>
-              <a:rPr lang="en-GB" dirty="0" smtClean="0">
-                <a:solidFill>
-                  <a:srgbClr val="FF0000"/>
-                </a:solidFill>
-              </a:rPr>
-              <a:t>Alternative Portal</a:t>
-            </a:r>
-            <a:endParaRPr lang="en-GB" dirty="0">
-              <a:solidFill>
-                <a:srgbClr val="FF0000"/>
-              </a:solidFill>
-            </a:endParaRPr>
-          </a:p>
-        </p:txBody>
-      </p:sp>
-      <p:sp>
-        <p:nvSpPr>
-          <p:cNvPr id="3" name="Content Placeholder 2"/>
-          <p:cNvSpPr>
-            <a:spLocks noGrp="1"/>
-          </p:cNvSpPr>
-          <p:nvPr>
-            <p:ph idx="1"/>
-          </p:nvPr>
-        </p:nvSpPr>
-        <p:spPr/>
-        <p:txBody>
           <a:bodyPr>
             <a:normAutofit/>
           </a:bodyPr>
           <a:lstStyle/>
           <a:p>
-            <a:pPr marL="0" indent="0">
-              <a:buNone/>
-            </a:pPr>
-            <a:r>
-              <a:rPr lang="en-GB" sz="2000" dirty="0" smtClean="0">
-                <a:solidFill>
-                  <a:srgbClr val="FF0000"/>
-                </a:solidFill>
-              </a:rPr>
-              <a:t>As some of the countries may not have reliable data signal an alternative way to report violations could be through SMS or a phone call to Save the Children who have access to the portal.</a:t>
-            </a:r>
-            <a:endParaRPr lang="en-GB" sz="2000" dirty="0">
-              <a:solidFill>
-                <a:srgbClr val="FF0000"/>
-              </a:solidFill>
-            </a:endParaRPr>
-          </a:p>
-        </p:txBody>
-      </p:sp>
+            <a:r>
+              <a:rPr lang="en-US" sz="3200" dirty="0"/>
+              <a:t>Reports administration – </a:t>
+            </a:r>
+            <a:r>
+              <a:rPr lang="en-GB" sz="3200" dirty="0"/>
+              <a:t>view </a:t>
+            </a:r>
+            <a:r>
+              <a:rPr lang="en-GB" sz="3200" dirty="0" smtClean="0"/>
+              <a:t>reports heat map</a:t>
+            </a:r>
+            <a:endParaRPr lang="en-US" sz="3200" dirty="0"/>
+          </a:p>
+        </p:txBody>
+      </p:sp>
+      <p:pic>
+        <p:nvPicPr>
+          <p:cNvPr id="4" name="Content Placeholder 3" descr="ReportMap.png"/>
+          <p:cNvPicPr>
+            <a:picLocks noGrp="1" noChangeAspect="1"/>
+          </p:cNvPicPr>
+          <p:nvPr>
+            <p:ph idx="1"/>
+          </p:nvPr>
+        </p:nvPicPr>
+        <p:blipFill>
+          <a:blip r:embed="rId2">
+            <a:extLst>
+              <a:ext uri="{28A0092B-C50C-407E-A947-70E740481C1C}">
+                <a14:useLocalDpi xmlns:a14="http://schemas.microsoft.com/office/drawing/2010/main" val="0"/>
+              </a:ext>
+            </a:extLst>
+          </a:blip>
+          <a:srcRect l="-22081" r="-22081"/>
+          <a:stretch>
+            <a:fillRect/>
+          </a:stretch>
+        </p:blipFill>
+        <p:spPr/>
+      </p:pic>
     </p:spTree>
     <p:extLst>
       <p:ext uri="{BB962C8B-B14F-4D97-AF65-F5344CB8AC3E}">
-        <p14:creationId xmlns:p14="http://schemas.microsoft.com/office/powerpoint/2010/main" val="2681488024"/>
+        <p14:creationId xmlns:p14="http://schemas.microsoft.com/office/powerpoint/2010/main" val="2392760408"/>
       </p:ext>
     </p:extLst>
   </p:cSld>
   <p:clrMapOvr>
     <a:masterClrMapping/>
   </p:clrMapOvr>
-  <mc:AlternateContent xmlns:mc="http://schemas.openxmlformats.org/markup-compatibility/2006">
-    <mc:Choice xmlns:p14="http://schemas.microsoft.com/office/powerpoint/2010/main" Requires="p14">
-      <p:transition spd="slow" p14:dur="2000"/>
-    </mc:Choice>
-    <mc:Fallback>
-      <p:transition xmlns:p14="http://schemas.microsoft.com/office/powerpoint/2010/main" spd="slow"/>
-    </mc:Fallback>
-  </mc:AlternateContent>
-  <p:timing>
-    <p:tnLst>
-      <p:par>
-        <p:cTn xmlns:p14="http://schemas.microsoft.com/office/powerpoint/2010/main" id="1" dur="indefinite" restart="never" nodeType="tmRoot"/>
-      </p:par>
-    </p:tnLst>
-  </p:timing>
 </p:sld>
 </file>
 
@@ -7321,7 +7197,7 @@
           <a:p>
             <a:r>
               <a:rPr lang="en-US" dirty="0" smtClean="0"/>
-              <a:t>Reports administration</a:t>
+              <a:t>Other functionality</a:t>
             </a:r>
             <a:endParaRPr lang="en-US" dirty="0"/>
           </a:p>
@@ -7347,7 +7223,7 @@
             </a:pPr>
             <a:r>
               <a:rPr lang="en-US" dirty="0" smtClean="0"/>
-              <a:t>The reporting capability will generate a lot of data. This will have to be processed to filter and highlight the most important of the reports.</a:t>
+              <a:t>Below we’ll describe the main idea points and the high level solution vision for the parts of the portal we were not able to detail on time.</a:t>
             </a:r>
           </a:p>
           <a:p>
@@ -7356,28 +7232,15 @@
             </a:pPr>
             <a:r>
               <a:rPr lang="en-US" dirty="0" smtClean="0"/>
-              <a:t>For this we propose two stages review:</a:t>
-            </a:r>
-          </a:p>
-          <a:p>
-            <a:r>
-              <a:rPr lang="en-US" dirty="0" smtClean="0"/>
-              <a:t>System scoring</a:t>
-            </a:r>
-          </a:p>
-          <a:p>
-            <a:r>
-              <a:rPr lang="en-US" dirty="0" smtClean="0"/>
-              <a:t>Manual review</a:t>
-            </a:r>
-            <a:endParaRPr lang="en-US" dirty="0"/>
+              <a:t>As afore mentioned all the functionality can be developed in stages and added one by one.</a:t>
+            </a:r>
           </a:p>
         </p:txBody>
       </p:sp>
     </p:spTree>
     <p:extLst>
       <p:ext uri="{BB962C8B-B14F-4D97-AF65-F5344CB8AC3E}">
-        <p14:creationId xmlns:p14="http://schemas.microsoft.com/office/powerpoint/2010/main" val="2364891170"/>
+        <p14:creationId xmlns:p14="http://schemas.microsoft.com/office/powerpoint/2010/main" val="3884430200"/>
       </p:ext>
     </p:extLst>
   </p:cSld>
@@ -7416,16 +7279,14 @@
         </p:nvSpPr>
         <p:spPr/>
         <p:txBody>
-          <a:bodyPr>
-            <a:normAutofit/>
-          </a:bodyPr>
-          <a:lstStyle/>
-          <a:p>
-            <a:r>
-              <a:rPr lang="en-US" sz="4000" dirty="0" smtClean="0"/>
-              <a:t>Reports administration – system scoring</a:t>
-            </a:r>
-            <a:endParaRPr lang="en-US" sz="4000" dirty="0"/>
+          <a:bodyPr/>
+          <a:lstStyle/>
+          <a:p>
+            <a:r>
+              <a:rPr lang="en-US" dirty="0" smtClean="0"/>
+              <a:t>Other functionality</a:t>
+            </a:r>
+            <a:endParaRPr lang="en-US" dirty="0"/>
           </a:p>
         </p:txBody>
       </p:sp>
@@ -7449,65 +7310,42 @@
             </a:pPr>
             <a:r>
               <a:rPr lang="en-US" dirty="0" smtClean="0"/>
-              <a:t>The system will be able to assign a credibility score to a report based on the number of factors:</a:t>
+              <a:t>Other functionality:</a:t>
             </a:r>
           </a:p>
           <a:p>
             <a:r>
               <a:rPr lang="en-US" dirty="0" smtClean="0"/>
-              <a:t>Reporter’s previous activity</a:t>
+              <a:t>Donation/storage/distribution nodes management</a:t>
             </a:r>
           </a:p>
           <a:p>
             <a:r>
               <a:rPr lang="en-US" dirty="0" smtClean="0"/>
-              <a:t>New or existing (with history) reporter</a:t>
+              <a:t>Manage and track distribution</a:t>
             </a:r>
           </a:p>
           <a:p>
             <a:r>
               <a:rPr lang="en-US" dirty="0" smtClean="0"/>
-              <a:t>Reporter’s occupation</a:t>
-            </a:r>
-          </a:p>
-          <a:p>
-            <a:r>
-              <a:rPr lang="en-US" dirty="0" smtClean="0"/>
-              <a:t>Hard details (pictures, </a:t>
-            </a:r>
-            <a:r>
-              <a:rPr lang="en-US" dirty="0" err="1" smtClean="0"/>
-              <a:t>gps</a:t>
-            </a:r>
-            <a:r>
-              <a:rPr lang="en-US" dirty="0" smtClean="0"/>
-              <a:t> coordinates)</a:t>
-            </a:r>
-          </a:p>
-          <a:p>
-            <a:r>
-              <a:rPr lang="en-US" dirty="0" smtClean="0"/>
-              <a:t>…any other</a:t>
-            </a:r>
+              <a:t>Join incomplete kits</a:t>
+            </a:r>
+          </a:p>
+          <a:p>
+            <a:endParaRPr lang="en-US" dirty="0" smtClean="0"/>
           </a:p>
           <a:p>
             <a:pPr marL="0" indent="0">
               <a:buNone/>
             </a:pPr>
-            <a:r>
-              <a:rPr lang="en-US" dirty="0" smtClean="0"/>
-              <a:t>The reports will be listed in an admin console with this score attached.</a:t>
-            </a:r>
-          </a:p>
-          <a:p>
-            <a:endParaRPr lang="en-US" dirty="0"/>
+            <a:endParaRPr lang="en-US" dirty="0" smtClean="0"/>
           </a:p>
         </p:txBody>
       </p:sp>
     </p:spTree>
     <p:extLst>
       <p:ext uri="{BB962C8B-B14F-4D97-AF65-F5344CB8AC3E}">
-        <p14:creationId xmlns:p14="http://schemas.microsoft.com/office/powerpoint/2010/main" val="200930542"/>
+        <p14:creationId xmlns:p14="http://schemas.microsoft.com/office/powerpoint/2010/main" val="1064514909"/>
       </p:ext>
     </p:extLst>
   </p:cSld>
@@ -7546,51 +7384,46 @@
         </p:nvSpPr>
         <p:spPr/>
         <p:txBody>
-          <a:bodyPr>
-            <a:normAutofit/>
-          </a:bodyPr>
-          <a:lstStyle/>
-          <a:p>
-            <a:r>
-              <a:rPr lang="en-US" sz="4000" dirty="0" smtClean="0"/>
-              <a:t>Reports administration – manual review</a:t>
-            </a:r>
-            <a:endParaRPr lang="en-US" sz="4000" dirty="0"/>
-          </a:p>
-        </p:txBody>
-      </p:sp>
-      <p:sp>
-        <p:nvSpPr>
-          <p:cNvPr id="3" name="Content Placeholder 2"/>
-          <p:cNvSpPr>
-            <a:spLocks noGrp="1"/>
-          </p:cNvSpPr>
+          <a:bodyPr/>
+          <a:lstStyle/>
+          <a:p>
+            <a:r>
+              <a:rPr lang="en-US" dirty="0" smtClean="0"/>
+              <a:t>Distribution status</a:t>
+            </a:r>
+            <a:endParaRPr lang="en-US" dirty="0"/>
+          </a:p>
+        </p:txBody>
+      </p:sp>
+      <p:pic>
+        <p:nvPicPr>
+          <p:cNvPr id="8" name="Content Placeholder 7" descr="DistributionNetwork.png"/>
+          <p:cNvPicPr>
+            <a:picLocks noGrp="1" noChangeAspect="1"/>
+          </p:cNvPicPr>
           <p:nvPr>
             <p:ph idx="1"/>
           </p:nvPr>
-        </p:nvSpPr>
-        <p:spPr/>
-        <p:txBody>
-          <a:bodyPr/>
-          <a:lstStyle/>
-          <a:p>
-            <a:pPr marL="0" indent="0">
-              <a:buNone/>
-            </a:pPr>
-            <a:r>
-              <a:rPr lang="en-US" dirty="0" smtClean="0"/>
-              <a:t>An administrator or someone entitled to review the reports will be able to login into the STC Portal and review and action the reports.</a:t>
-            </a:r>
-          </a:p>
-          <a:p>
-            <a:endParaRPr lang="en-US" dirty="0"/>
-          </a:p>
-        </p:txBody>
-      </p:sp>
+        </p:nvPicPr>
+        <p:blipFill>
+          <a:blip r:embed="rId3">
+            <a:extLst>
+              <a:ext uri="{28A0092B-C50C-407E-A947-70E740481C1C}">
+                <a14:useLocalDpi xmlns:a14="http://schemas.microsoft.com/office/drawing/2010/main" val="0"/>
+              </a:ext>
+            </a:extLst>
+          </a:blip>
+          <a:srcRect l="-22081" r="-22081"/>
+          <a:stretch>
+            <a:fillRect/>
+          </a:stretch>
+        </p:blipFill>
+        <p:spPr/>
+      </p:pic>
     </p:spTree>
     <p:extLst>
       <p:ext uri="{BB962C8B-B14F-4D97-AF65-F5344CB8AC3E}">
-        <p14:creationId xmlns:p14="http://schemas.microsoft.com/office/powerpoint/2010/main" val="980752186"/>
+        <p14:creationId xmlns:p14="http://schemas.microsoft.com/office/powerpoint/2010/main" val="1225648608"/>
       </p:ext>
     </p:extLst>
   </p:cSld>
@@ -7627,63 +7460,117 @@
             <p:ph type="title"/>
           </p:nvPr>
         </p:nvSpPr>
+        <p:spPr/>
+        <p:txBody>
+          <a:bodyPr/>
+          <a:lstStyle/>
+          <a:p>
+            <a:r>
+              <a:rPr lang="en-US" dirty="0" smtClean="0"/>
+              <a:t>Node registrations</a:t>
+            </a:r>
+            <a:endParaRPr lang="en-US" dirty="0"/>
+          </a:p>
+        </p:txBody>
+      </p:sp>
+      <p:sp>
+        <p:nvSpPr>
+          <p:cNvPr id="3" name="Content Placeholder 2"/>
+          <p:cNvSpPr>
+            <a:spLocks noGrp="1"/>
+          </p:cNvSpPr>
+          <p:nvPr>
+            <p:ph idx="1"/>
+          </p:nvPr>
+        </p:nvSpPr>
         <p:spPr>
           <a:xfrm>
-            <a:off x="762000" y="5164666"/>
-            <a:ext cx="6781800" cy="1007533"/>
+            <a:off x="762000" y="685800"/>
+            <a:ext cx="7543800" cy="4546600"/>
           </a:xfrm>
         </p:spPr>
         <p:txBody>
           <a:bodyPr>
-            <a:noAutofit/>
+            <a:normAutofit fontScale="92500" lnSpcReduction="20000"/>
           </a:bodyPr>
           <a:lstStyle/>
           <a:p>
-            <a:r>
-              <a:rPr lang="en-US" sz="3200" dirty="0"/>
-              <a:t>Reports administration – </a:t>
-            </a:r>
-            <a:r>
-              <a:rPr lang="en-GB" sz="3200" dirty="0"/>
-              <a:t>view suspected </a:t>
-            </a:r>
-            <a:r>
-              <a:rPr lang="en-GB" sz="3200" dirty="0" smtClean="0"/>
-              <a:t>violations reports</a:t>
-            </a:r>
-            <a:endParaRPr lang="en-US" sz="3200" dirty="0"/>
-          </a:p>
-        </p:txBody>
-      </p:sp>
-      <p:pic>
-        <p:nvPicPr>
-          <p:cNvPr id="6" name="Content Placeholder 5" descr="ReportList.png"/>
-          <p:cNvPicPr>
-            <a:picLocks noGrp="1" noChangeAspect="1"/>
-          </p:cNvPicPr>
-          <p:nvPr>
-            <p:ph idx="1"/>
-          </p:nvPr>
-        </p:nvPicPr>
-        <p:blipFill>
-          <a:blip r:embed="rId3">
-            <a:extLst>
-              <a:ext uri="{28A0092B-C50C-407E-A947-70E740481C1C}">
-                <a14:useLocalDpi xmlns:a14="http://schemas.microsoft.com/office/drawing/2010/main" val="0"/>
-              </a:ext>
-            </a:extLst>
-          </a:blip>
-          <a:srcRect l="-22182" r="-22182"/>
-          <a:stretch>
-            <a:fillRect/>
-          </a:stretch>
-        </p:blipFill>
-        <p:spPr/>
-      </p:pic>
+            <a:pPr marL="0" indent="0">
+              <a:buNone/>
+            </a:pPr>
+            <a:r>
+              <a:rPr lang="en-US" dirty="0"/>
+              <a:t>To manage the problem of ad-hoc distribution of donations, the portal will offer donors the capability to register a collection </a:t>
+            </a:r>
+            <a:r>
+              <a:rPr lang="en-US" dirty="0" err="1"/>
+              <a:t>centre</a:t>
+            </a:r>
+            <a:r>
+              <a:rPr lang="en-US" dirty="0"/>
+              <a:t> that can link into Save the Children’s distribution network.</a:t>
+            </a:r>
+          </a:p>
+          <a:p>
+            <a:endParaRPr lang="en-US" dirty="0"/>
+          </a:p>
+          <a:p>
+            <a:r>
+              <a:rPr lang="en-US" dirty="0"/>
+              <a:t>The portal can provide advice and information about suitable items for donation and restricted items such as breast milk substitutes.</a:t>
+            </a:r>
+          </a:p>
+          <a:p>
+            <a:r>
+              <a:rPr lang="en-US" dirty="0"/>
+              <a:t>It allows the individual or </a:t>
+            </a:r>
+            <a:r>
+              <a:rPr lang="en-US" dirty="0" err="1"/>
+              <a:t>organisation</a:t>
+            </a:r>
+            <a:r>
+              <a:rPr lang="en-US" dirty="0"/>
+              <a:t> to register a collection </a:t>
+            </a:r>
+            <a:r>
+              <a:rPr lang="en-US" dirty="0" err="1"/>
+              <a:t>centre</a:t>
+            </a:r>
+            <a:r>
+              <a:rPr lang="en-US" dirty="0"/>
+              <a:t> and provide information about the “collection event” including when and where.</a:t>
+            </a:r>
+          </a:p>
+          <a:p>
+            <a:r>
+              <a:rPr lang="en-US" dirty="0"/>
+              <a:t>Identifies a suitable distribution </a:t>
+            </a:r>
+            <a:r>
+              <a:rPr lang="en-US" dirty="0" err="1"/>
+              <a:t>centre</a:t>
+            </a:r>
+            <a:r>
+              <a:rPr lang="en-US" dirty="0"/>
+              <a:t>(s) where the donated items should be delivered.</a:t>
+            </a:r>
+          </a:p>
+          <a:p>
+            <a:r>
+              <a:rPr lang="en-US" dirty="0"/>
+              <a:t>Provides feedback to the donor about where their donated items have been used.</a:t>
+            </a:r>
+          </a:p>
+          <a:p>
+            <a:endParaRPr lang="en-US" dirty="0"/>
+          </a:p>
+        </p:txBody>
+      </p:sp>
     </p:spTree>
     <p:extLst>
       <p:ext uri="{BB962C8B-B14F-4D97-AF65-F5344CB8AC3E}">
-        <p14:creationId xmlns:p14="http://schemas.microsoft.com/office/powerpoint/2010/main" val="1901231383"/>
+        <p14:creationId xmlns:p14="http://schemas.microsoft.com/office/powerpoint/2010/main" val="1298513338"/>
       </p:ext>
     </p:extLst>
   </p:cSld>
@@ -7728,24 +7615,16 @@
           <a:lstStyle/>
           <a:p>
             <a:r>
-              <a:rPr lang="en-US" sz="3200" dirty="0"/>
-              <a:t>Reports administration – </a:t>
-            </a:r>
-            <a:r>
-              <a:rPr lang="en-GB" sz="3200" dirty="0"/>
-              <a:t>view </a:t>
-            </a:r>
-            <a:r>
-              <a:rPr lang="en-GB" sz="3200" dirty="0" smtClean="0"/>
-              <a:t>reports heat map</a:t>
-            </a:r>
-            <a:endParaRPr lang="en-US" sz="3200" dirty="0"/>
+              <a:rPr lang="en-US" dirty="0" smtClean="0"/>
+              <a:t>New node requests</a:t>
+            </a:r>
+            <a:endParaRPr lang="en-US" dirty="0"/>
           </a:p>
         </p:txBody>
       </p:sp>
       <p:pic>
         <p:nvPicPr>
-          <p:cNvPr id="4" name="Content Placeholder 3" descr="ReportMap.png"/>
+          <p:cNvPr id="4" name="Content Placeholder 3" descr="PendingNodeRequests.png"/>
           <p:cNvPicPr>
             <a:picLocks noGrp="1" noChangeAspect="1"/>
           </p:cNvPicPr>
@@ -7754,14 +7633,14 @@
           </p:nvPr>
         </p:nvPicPr>
         <p:blipFill>
-          <a:blip r:embed="rId2">
+          <a:blip r:embed="rId3">
             <a:extLst>
               <a:ext uri="{28A0092B-C50C-407E-A947-70E740481C1C}">
                 <a14:useLocalDpi xmlns:a14="http://schemas.microsoft.com/office/drawing/2010/main" val="0"/>
               </a:ext>
             </a:extLst>
           </a:blip>
-          <a:srcRect l="-22081" r="-22081"/>
+          <a:srcRect l="-22182" r="-22182"/>
           <a:stretch>
             <a:fillRect/>
           </a:stretch>
@@ -7771,7 +7650,7 @@
     </p:spTree>
     <p:extLst>
       <p:ext uri="{BB962C8B-B14F-4D97-AF65-F5344CB8AC3E}">
-        <p14:creationId xmlns:p14="http://schemas.microsoft.com/office/powerpoint/2010/main" val="2392760408"/>
+        <p14:creationId xmlns:p14="http://schemas.microsoft.com/office/powerpoint/2010/main" val="2926113403"/>
       </p:ext>
     </p:extLst>
   </p:cSld>
@@ -7810,31 +7689,71 @@
         </p:nvSpPr>
         <p:spPr/>
         <p:txBody>
-          <a:bodyPr/>
-          <a:lstStyle/>
-          <a:p>
+          <a:bodyPr>
+            <a:normAutofit/>
+          </a:bodyPr>
+          <a:lstStyle/>
+          <a:p>
+            <a:r>
+              <a:rPr lang="en-US" sz="3000" dirty="0" smtClean="0"/>
+              <a:t>Inventory and distribution of donated stock</a:t>
+            </a:r>
+            <a:endParaRPr lang="en-US" sz="3000" dirty="0"/>
+          </a:p>
+        </p:txBody>
+      </p:sp>
+      <p:sp>
+        <p:nvSpPr>
+          <p:cNvPr id="3" name="Content Placeholder 2"/>
+          <p:cNvSpPr>
+            <a:spLocks noGrp="1"/>
+          </p:cNvSpPr>
+          <p:nvPr>
+            <p:ph idx="1"/>
+          </p:nvPr>
+        </p:nvSpPr>
+        <p:spPr>
+          <a:xfrm>
+            <a:off x="762000" y="685799"/>
+            <a:ext cx="7543800" cy="4428067"/>
+          </a:xfrm>
+        </p:spPr>
+        <p:txBody>
+          <a:bodyPr/>
+          <a:lstStyle/>
+          <a:p>
+            <a:r>
+              <a:rPr lang="en-US" dirty="0"/>
+              <a:t>At the point of stock is donated save the children will produce inventory quantity, sell by date and source</a:t>
+            </a:r>
             <a:r>
               <a:rPr lang="en-US" dirty="0" smtClean="0"/>
-              <a:t>Other functionality</a:t>
+              <a:t>.</a:t>
+            </a:r>
+          </a:p>
+          <a:p>
+            <a:r>
+              <a:rPr lang="en-US" dirty="0" smtClean="0"/>
+              <a:t>Stock will be QR labeled for easy tracking</a:t>
             </a:r>
             <a:endParaRPr lang="en-US" dirty="0"/>
           </a:p>
-        </p:txBody>
-      </p:sp>
-      <p:sp>
-        <p:nvSpPr>
-          <p:cNvPr id="3" name="Content Placeholder 2"/>
-          <p:cNvSpPr>
-            <a:spLocks noGrp="1"/>
-          </p:cNvSpPr>
-          <p:nvPr>
-            <p:ph idx="1"/>
-          </p:nvPr>
-        </p:nvSpPr>
-        <p:spPr/>
-        <p:txBody>
-          <a:bodyPr/>
-          <a:lstStyle/>
+          <a:p>
+            <a:r>
+              <a:rPr lang="en-US" dirty="0" smtClean="0"/>
+              <a:t>Data </a:t>
+            </a:r>
+            <a:r>
+              <a:rPr lang="en-US" dirty="0"/>
+              <a:t>will be stored and access trough the portal</a:t>
+            </a:r>
+          </a:p>
+          <a:p>
+            <a:r>
+              <a:rPr lang="en-US" dirty="0"/>
+              <a:t>Ease of stock control and distribution</a:t>
+            </a:r>
+          </a:p>
           <a:p>
             <a:endParaRPr lang="en-US" dirty="0"/>
           </a:p>
@@ -7843,7 +7762,7 @@
     </p:spTree>
     <p:extLst>
       <p:ext uri="{BB962C8B-B14F-4D97-AF65-F5344CB8AC3E}">
-        <p14:creationId xmlns:p14="http://schemas.microsoft.com/office/powerpoint/2010/main" val="3884430200"/>
+        <p14:creationId xmlns:p14="http://schemas.microsoft.com/office/powerpoint/2010/main" val="2911306856"/>
       </p:ext>
     </p:extLst>
   </p:cSld>
@@ -7888,18 +7807,9 @@
           <a:lstStyle/>
           <a:p>
             <a:r>
-              <a:rPr lang="en-GB" dirty="0" smtClean="0">
-                <a:solidFill>
-                  <a:srgbClr val="FF0000"/>
-                </a:solidFill>
-              </a:rPr>
-              <a:t>Save the Children Portal Page</a:t>
-            </a:r>
-            <a:endParaRPr lang="en-GB" dirty="0">
-              <a:solidFill>
-                <a:srgbClr val="FF0000"/>
-              </a:solidFill>
-            </a:endParaRPr>
+              <a:rPr lang="en-US" dirty="0"/>
+              <a:t>Mapping of available stock </a:t>
+            </a:r>
           </a:p>
         </p:txBody>
       </p:sp>
@@ -7917,101 +7827,41 @@
         <p:txBody>
           <a:bodyPr/>
           <a:lstStyle/>
-          <a:p>
-            <a:pPr marL="0" indent="0" algn="ctr">
-              <a:buNone/>
-            </a:pPr>
-            <a:r>
-              <a:rPr lang="en-GB" dirty="0" smtClean="0">
-                <a:solidFill>
-                  <a:srgbClr val="FF0000"/>
-                </a:solidFill>
-              </a:rPr>
-              <a:t>Report managing</a:t>
-            </a:r>
-          </a:p>
-          <a:p>
-            <a:pPr marL="0" indent="0" algn="ctr">
-              <a:buNone/>
-            </a:pPr>
-            <a:endParaRPr lang="en-GB" dirty="0" smtClean="0">
-              <a:solidFill>
-                <a:srgbClr val="FF0000"/>
-              </a:solidFill>
-            </a:endParaRPr>
-          </a:p>
-          <a:p>
-            <a:r>
-              <a:rPr lang="en-GB" sz="2000" dirty="0" smtClean="0">
-                <a:solidFill>
-                  <a:srgbClr val="FF0000"/>
-                </a:solidFill>
-              </a:rPr>
-              <a:t>Administrators will be able to approve violations</a:t>
-            </a:r>
-          </a:p>
-          <a:p>
-            <a:r>
-              <a:rPr lang="en-GB" sz="2000" dirty="0" smtClean="0">
-                <a:solidFill>
-                  <a:srgbClr val="FF0000"/>
-                </a:solidFill>
-              </a:rPr>
-              <a:t>Donation centres</a:t>
-            </a:r>
-          </a:p>
-          <a:p>
-            <a:r>
-              <a:rPr lang="en-GB" sz="2000" dirty="0" smtClean="0">
-                <a:solidFill>
-                  <a:srgbClr val="FF0000"/>
-                </a:solidFill>
-              </a:rPr>
-              <a:t>Manage and track distribution</a:t>
-            </a:r>
-          </a:p>
-          <a:p>
-            <a:r>
-              <a:rPr lang="en-GB" sz="2000" dirty="0" smtClean="0">
-                <a:solidFill>
-                  <a:srgbClr val="FF0000"/>
-                </a:solidFill>
-              </a:rPr>
-              <a:t>Joining kits</a:t>
-            </a:r>
-          </a:p>
           <a:p>
             <a:pPr marL="0" indent="0">
               <a:buNone/>
             </a:pPr>
-            <a:endParaRPr lang="en-GB" dirty="0" smtClean="0">
-              <a:solidFill>
-                <a:srgbClr val="FF0000"/>
-              </a:solidFill>
-            </a:endParaRPr>
-          </a:p>
-          <a:p>
-            <a:endParaRPr lang="en-GB" dirty="0"/>
+            <a:r>
+              <a:rPr lang="en-US" dirty="0"/>
+              <a:t>Stock accessed by the portal can be easily displayed by a map </a:t>
+            </a:r>
+            <a:r>
+              <a:rPr lang="en-US" dirty="0" smtClean="0"/>
+              <a:t>format.</a:t>
+            </a:r>
+          </a:p>
+          <a:p>
+            <a:pPr marL="0" indent="0">
+              <a:buNone/>
+            </a:pPr>
+            <a:r>
+              <a:rPr lang="en-US" dirty="0" smtClean="0"/>
+              <a:t>GPS pallets can be used, or simple by tracking through the neural network described above that can be overlaid over Google maps.</a:t>
+            </a:r>
+            <a:endParaRPr lang="en-US" dirty="0"/>
           </a:p>
         </p:txBody>
       </p:sp>
     </p:spTree>
     <p:extLst>
       <p:ext uri="{BB962C8B-B14F-4D97-AF65-F5344CB8AC3E}">
-        <p14:creationId xmlns:p14="http://schemas.microsoft.com/office/powerpoint/2010/main" val="586191138"/>
+        <p14:creationId xmlns:p14="http://schemas.microsoft.com/office/powerpoint/2010/main" val="1926339810"/>
       </p:ext>
     </p:extLst>
   </p:cSld>
   <p:clrMapOvr>
     <a:masterClrMapping/>
   </p:clrMapOvr>
-  <p:timing>
-    <p:tnLst>
-      <p:par>
-        <p:cTn xmlns:p14="http://schemas.microsoft.com/office/powerpoint/2010/main" id="1" dur="indefinite" restart="never" nodeType="tmRoot"/>
-      </p:par>
-    </p:tnLst>
-  </p:timing>
 </p:sld>
 </file>
 
@@ -8042,7 +7892,12 @@
             <p:ph type="title"/>
           </p:nvPr>
         </p:nvSpPr>
-        <p:spPr/>
+        <p:spPr>
+          <a:xfrm>
+            <a:off x="762000" y="5164666"/>
+            <a:ext cx="6781800" cy="1007533"/>
+          </a:xfrm>
+        </p:spPr>
         <p:txBody>
           <a:bodyPr>
             <a:normAutofit/>
@@ -8050,60 +7905,75 @@
           <a:lstStyle/>
           <a:p>
             <a:r>
-              <a:rPr lang="en-GB" dirty="0" smtClean="0"/>
-              <a:t>Distribution status</a:t>
-            </a:r>
-            <a:endParaRPr lang="en-GB" dirty="0"/>
-          </a:p>
-        </p:txBody>
-      </p:sp>
-      <p:pic>
-        <p:nvPicPr>
-          <p:cNvPr id="3" name="Picture 2" descr="DistributionNetwork.png"/>
-          <p:cNvPicPr>
-            <a:picLocks noChangeAspect="1"/>
-          </p:cNvPicPr>
-          <p:nvPr/>
-        </p:nvPicPr>
-        <p:blipFill>
-          <a:blip r:embed="rId2">
-            <a:extLst>
-              <a:ext uri="{28A0092B-C50C-407E-A947-70E740481C1C}">
-                <a14:useLocalDpi xmlns:a14="http://schemas.microsoft.com/office/drawing/2010/main" val="0"/>
-              </a:ext>
-            </a:extLst>
-          </a:blip>
-          <a:stretch>
-            <a:fillRect/>
-          </a:stretch>
-        </p:blipFill>
-        <p:spPr>
-          <a:xfrm>
-            <a:off x="-4275" y="1556792"/>
-            <a:ext cx="9144000" cy="5715000"/>
-          </a:xfrm>
-          <a:prstGeom prst="rect">
-            <a:avLst/>
-          </a:prstGeom>
-        </p:spPr>
-      </p:pic>
+              <a:rPr lang="en-US" sz="4400" dirty="0"/>
+              <a:t>View/Download Information</a:t>
+            </a:r>
+          </a:p>
+        </p:txBody>
+      </p:sp>
+      <p:sp>
+        <p:nvSpPr>
+          <p:cNvPr id="3" name="Content Placeholder 2"/>
+          <p:cNvSpPr>
+            <a:spLocks noGrp="1"/>
+          </p:cNvSpPr>
+          <p:nvPr>
+            <p:ph idx="1"/>
+          </p:nvPr>
+        </p:nvSpPr>
+        <p:spPr/>
+        <p:txBody>
+          <a:bodyPr/>
+          <a:lstStyle/>
+          <a:p>
+            <a:r>
+              <a:rPr lang="en-US" dirty="0"/>
+              <a:t>Download information on the nearest distribution </a:t>
+            </a:r>
+            <a:r>
+              <a:rPr lang="en-US" dirty="0" err="1"/>
+              <a:t>centre</a:t>
+            </a:r>
+            <a:r>
+              <a:rPr lang="en-US" dirty="0"/>
+              <a:t> of aid</a:t>
+            </a:r>
+          </a:p>
+          <a:p>
+            <a:r>
+              <a:rPr lang="en-US" dirty="0"/>
+              <a:t>A map will be shown of where suppliers can donate emergency supplies</a:t>
+            </a:r>
+          </a:p>
+          <a:p>
+            <a:r>
+              <a:rPr lang="en-US" dirty="0"/>
+              <a:t>Information will be supplied on reports that have unsolicited milk distributions</a:t>
+            </a:r>
+          </a:p>
+          <a:p>
+            <a:r>
+              <a:rPr lang="en-US" dirty="0"/>
+              <a:t>Information of breast milk is the best way to feed </a:t>
+            </a:r>
+            <a:r>
+              <a:rPr lang="en-US" dirty="0" smtClean="0"/>
+              <a:t>children</a:t>
+            </a:r>
+            <a:endParaRPr lang="en-US" dirty="0"/>
+          </a:p>
+        </p:txBody>
+      </p:sp>
     </p:spTree>
     <p:extLst>
       <p:ext uri="{BB962C8B-B14F-4D97-AF65-F5344CB8AC3E}">
-        <p14:creationId xmlns:p14="http://schemas.microsoft.com/office/powerpoint/2010/main" val="1456492130"/>
+        <p14:creationId xmlns:p14="http://schemas.microsoft.com/office/powerpoint/2010/main" val="3908249500"/>
       </p:ext>
     </p:extLst>
   </p:cSld>
   <p:clrMapOvr>
     <a:masterClrMapping/>
   </p:clrMapOvr>
-  <p:timing>
-    <p:tnLst>
-      <p:par>
-        <p:cTn xmlns:p14="http://schemas.microsoft.com/office/powerpoint/2010/main" id="1" dur="indefinite" restart="never" nodeType="tmRoot"/>
-      </p:par>
-    </p:tnLst>
-  </p:timing>
 </p:sld>
 </file>
 
@@ -8220,146 +8090,69 @@
             <p:ph type="title"/>
           </p:nvPr>
         </p:nvSpPr>
-        <p:spPr/>
+        <p:spPr>
+          <a:xfrm>
+            <a:off x="762000" y="5130800"/>
+            <a:ext cx="6781800" cy="1041400"/>
+          </a:xfrm>
+        </p:spPr>
         <p:txBody>
           <a:bodyPr>
-            <a:normAutofit fontScale="90000"/>
+            <a:noAutofit/>
           </a:bodyPr>
           <a:lstStyle/>
           <a:p>
             <a:r>
-              <a:rPr lang="en-GB" dirty="0" smtClean="0">
-                <a:solidFill>
-                  <a:srgbClr val="FF0000"/>
-                </a:solidFill>
-              </a:rPr>
-              <a:t>Save the Children Portal Page</a:t>
-            </a:r>
-            <a:endParaRPr lang="en-GB" dirty="0">
-              <a:solidFill>
-                <a:srgbClr val="FF0000"/>
-              </a:solidFill>
-            </a:endParaRPr>
-          </a:p>
-        </p:txBody>
-      </p:sp>
-      <p:sp>
-        <p:nvSpPr>
-          <p:cNvPr id="3" name="Content Placeholder 2"/>
-          <p:cNvSpPr>
-            <a:spLocks noGrp="1"/>
-          </p:cNvSpPr>
+              <a:rPr lang="en-US" sz="3600" dirty="0" smtClean="0"/>
+              <a:t>Portal Homepage - view</a:t>
+            </a:r>
+            <a:r>
+              <a:rPr lang="en-US" sz="3600" dirty="0"/>
+              <a:t>/Download Information</a:t>
+            </a:r>
+          </a:p>
+        </p:txBody>
+      </p:sp>
+      <p:pic>
+        <p:nvPicPr>
+          <p:cNvPr id="4" name="Content Placeholder 3" descr="HomePage.png"/>
+          <p:cNvPicPr>
+            <a:picLocks noGrp="1" noChangeAspect="1"/>
+          </p:cNvPicPr>
           <p:nvPr>
             <p:ph idx="1"/>
           </p:nvPr>
-        </p:nvSpPr>
-        <p:spPr/>
-        <p:txBody>
-          <a:bodyPr/>
-          <a:lstStyle/>
-          <a:p>
-            <a:pPr marL="0" indent="0">
-              <a:buNone/>
-            </a:pPr>
-            <a:r>
-              <a:rPr lang="en-GB" dirty="0" smtClean="0">
-                <a:solidFill>
-                  <a:srgbClr val="FF0000"/>
-                </a:solidFill>
-              </a:rPr>
-              <a:t>This page maybe enhanced for the following</a:t>
-            </a:r>
-          </a:p>
-          <a:p>
-            <a:pPr marL="0" indent="0">
-              <a:buNone/>
-            </a:pPr>
-            <a:endParaRPr lang="en-GB" dirty="0" smtClean="0">
-              <a:solidFill>
-                <a:srgbClr val="FF0000"/>
-              </a:solidFill>
-            </a:endParaRPr>
-          </a:p>
-          <a:p>
-            <a:r>
-              <a:rPr lang="en-GB" sz="2000" dirty="0">
-                <a:solidFill>
-                  <a:srgbClr val="FF0000"/>
-                </a:solidFill>
-              </a:rPr>
-              <a:t>Inventory and distribution of donated stock</a:t>
-            </a:r>
-          </a:p>
-          <a:p>
-            <a:r>
-              <a:rPr lang="en-GB" sz="2000" dirty="0">
-                <a:solidFill>
-                  <a:srgbClr val="FF0000"/>
-                </a:solidFill>
-              </a:rPr>
-              <a:t>Mapping of available stock </a:t>
-            </a:r>
-          </a:p>
-          <a:p>
-            <a:r>
-              <a:rPr lang="en-GB" sz="2000" dirty="0">
-                <a:solidFill>
-                  <a:srgbClr val="FF0000"/>
-                </a:solidFill>
-              </a:rPr>
-              <a:t>Setting up a donation centre</a:t>
-            </a:r>
-          </a:p>
-          <a:p>
-            <a:r>
-              <a:rPr lang="en-GB" sz="2000" dirty="0">
-                <a:solidFill>
-                  <a:srgbClr val="FF0000"/>
-                </a:solidFill>
-              </a:rPr>
-              <a:t>View and download </a:t>
-            </a:r>
-            <a:r>
-              <a:rPr lang="en-GB" sz="2000" dirty="0" smtClean="0">
-                <a:solidFill>
-                  <a:srgbClr val="FF0000"/>
-                </a:solidFill>
-              </a:rPr>
-              <a:t>information</a:t>
-            </a:r>
-          </a:p>
-          <a:p>
-            <a:r>
-              <a:rPr lang="en-GB" sz="2000" dirty="0" smtClean="0">
-                <a:solidFill>
-                  <a:srgbClr val="FF0000"/>
-                </a:solidFill>
-              </a:rPr>
-              <a:t>Administration</a:t>
-            </a:r>
-          </a:p>
-          <a:p>
-            <a:endParaRPr lang="en-GB" dirty="0"/>
-          </a:p>
-        </p:txBody>
-      </p:sp>
+        </p:nvPicPr>
+        <p:blipFill>
+          <a:blip r:embed="rId2">
+            <a:extLst>
+              <a:ext uri="{28A0092B-C50C-407E-A947-70E740481C1C}">
+                <a14:useLocalDpi xmlns:a14="http://schemas.microsoft.com/office/drawing/2010/main" val="0"/>
+              </a:ext>
+            </a:extLst>
+          </a:blip>
+          <a:srcRect l="-15860" r="-15860"/>
+          <a:stretch>
+            <a:fillRect/>
+          </a:stretch>
+        </p:blipFill>
+        <p:spPr>
+          <a:xfrm>
+            <a:off x="762000" y="685800"/>
+            <a:ext cx="7543800" cy="4259263"/>
+          </a:xfrm>
+        </p:spPr>
+      </p:pic>
     </p:spTree>
     <p:extLst>
       <p:ext uri="{BB962C8B-B14F-4D97-AF65-F5344CB8AC3E}">
-        <p14:creationId xmlns:p14="http://schemas.microsoft.com/office/powerpoint/2010/main" val="531854623"/>
+        <p14:creationId xmlns:p14="http://schemas.microsoft.com/office/powerpoint/2010/main" val="3580363701"/>
       </p:ext>
     </p:extLst>
   </p:cSld>
   <p:clrMapOvr>
     <a:masterClrMapping/>
   </p:clrMapOvr>
-  <p:timing>
-    <p:tnLst>
-      <p:par>
-        <p:cTn xmlns:p14="http://schemas.microsoft.com/office/powerpoint/2010/main" id="1" dur="indefinite" restart="never" nodeType="tmRoot"/>
-      </p:par>
-    </p:tnLst>
-  </p:timing>
 </p:sld>
 </file>
 
@@ -8392,697 +8185,27 @@
         </p:nvSpPr>
         <p:spPr/>
         <p:txBody>
-          <a:bodyPr>
-            <a:normAutofit fontScale="90000"/>
-          </a:bodyPr>
-          <a:lstStyle/>
-          <a:p>
-            <a:r>
-              <a:rPr lang="en-GB" dirty="0" smtClean="0">
-                <a:solidFill>
-                  <a:srgbClr val="FF0000"/>
-                </a:solidFill>
-              </a:rPr>
-              <a:t>Save the Children Portal Page</a:t>
-            </a:r>
-            <a:endParaRPr lang="en-GB" dirty="0">
-              <a:solidFill>
-                <a:srgbClr val="FF0000"/>
-              </a:solidFill>
-            </a:endParaRPr>
-          </a:p>
-        </p:txBody>
-      </p:sp>
-      <p:sp>
-        <p:nvSpPr>
-          <p:cNvPr id="3" name="Content Placeholder 2"/>
-          <p:cNvSpPr>
-            <a:spLocks noGrp="1"/>
-          </p:cNvSpPr>
-          <p:nvPr>
-            <p:ph idx="1"/>
-          </p:nvPr>
-        </p:nvSpPr>
-        <p:spPr/>
-        <p:txBody>
-          <a:bodyPr>
-            <a:normAutofit/>
-          </a:bodyPr>
-          <a:lstStyle/>
-          <a:p>
-            <a:pPr marL="0" indent="0" algn="ctr">
-              <a:buNone/>
-            </a:pPr>
-            <a:r>
-              <a:rPr lang="en-GB" sz="2000" dirty="0">
-                <a:solidFill>
-                  <a:srgbClr val="FF0000"/>
-                </a:solidFill>
-              </a:rPr>
-              <a:t>Inventory and distribution of </a:t>
-            </a:r>
-            <a:r>
-              <a:rPr lang="en-GB" sz="2000" dirty="0" smtClean="0">
-                <a:solidFill>
-                  <a:srgbClr val="FF0000"/>
-                </a:solidFill>
-              </a:rPr>
-              <a:t>donated stock</a:t>
-            </a:r>
-          </a:p>
-          <a:p>
-            <a:pPr marL="0" indent="0">
-              <a:buNone/>
-            </a:pPr>
-            <a:endParaRPr lang="en-GB" sz="2000" dirty="0" smtClean="0">
-              <a:solidFill>
-                <a:srgbClr val="FF0000"/>
-              </a:solidFill>
-            </a:endParaRPr>
-          </a:p>
-          <a:p>
-            <a:r>
-              <a:rPr lang="en-GB" sz="2000" dirty="0" smtClean="0">
-                <a:solidFill>
-                  <a:srgbClr val="FF0000"/>
-                </a:solidFill>
-              </a:rPr>
-              <a:t>At the point of stock is donated save the children will produce inventory quantity, sell by date and source.</a:t>
-            </a:r>
-          </a:p>
-          <a:p>
-            <a:r>
-              <a:rPr lang="en-GB" sz="2000" dirty="0" smtClean="0">
-                <a:solidFill>
-                  <a:srgbClr val="FF0000"/>
-                </a:solidFill>
-              </a:rPr>
-              <a:t>Data will be stored and access trough the portal</a:t>
-            </a:r>
-          </a:p>
-          <a:p>
-            <a:r>
-              <a:rPr lang="en-GB" sz="2000" dirty="0" smtClean="0">
-                <a:solidFill>
-                  <a:srgbClr val="FF0000"/>
-                </a:solidFill>
-              </a:rPr>
-              <a:t>Ease of stock control and distribution</a:t>
-            </a:r>
-          </a:p>
-          <a:p>
-            <a:pPr marL="0" indent="0">
-              <a:buNone/>
-            </a:pPr>
-            <a:endParaRPr lang="en-GB" sz="2000" dirty="0">
-              <a:solidFill>
-                <a:srgbClr val="FF0000"/>
-              </a:solidFill>
-            </a:endParaRPr>
-          </a:p>
-        </p:txBody>
-      </p:sp>
-    </p:spTree>
-    <p:extLst>
-      <p:ext uri="{BB962C8B-B14F-4D97-AF65-F5344CB8AC3E}">
-        <p14:creationId xmlns:p14="http://schemas.microsoft.com/office/powerpoint/2010/main" val="2238835990"/>
-      </p:ext>
-    </p:extLst>
-  </p:cSld>
-  <p:clrMapOvr>
-    <a:masterClrMapping/>
-  </p:clrMapOvr>
-  <p:timing>
-    <p:tnLst>
-      <p:par>
-        <p:cTn xmlns:p14="http://schemas.microsoft.com/office/powerpoint/2010/main" id="1" dur="indefinite" restart="never" nodeType="tmRoot"/>
-      </p:par>
-    </p:tnLst>
-  </p:timing>
-</p:sld>
-</file>
-
-<file path=ppt/slides/slide32.xml><?xml version="1.0" encoding="utf-8"?>
-<p:sld xmlns:a="http://schemas.openxmlformats.org/drawingml/2006/main" xmlns:r="http://schemas.openxmlformats.org/officeDocument/2006/relationships" xmlns:p="http://schemas.openxmlformats.org/presentationml/2006/main">
-  <p:cSld>
-    <p:spTree>
-      <p:nvGrpSpPr>
-        <p:cNvPr id="1" name=""/>
-        <p:cNvGrpSpPr/>
-        <p:nvPr/>
-      </p:nvGrpSpPr>
-      <p:grpSpPr>
-        <a:xfrm>
-          <a:off x="0" y="0"/>
-          <a:ext cx="0" cy="0"/>
-          <a:chOff x="0" y="0"/>
-          <a:chExt cx="0" cy="0"/>
-        </a:xfrm>
-      </p:grpSpPr>
-      <p:sp>
-        <p:nvSpPr>
-          <p:cNvPr id="2" name="Title 1"/>
-          <p:cNvSpPr>
-            <a:spLocks noGrp="1"/>
-          </p:cNvSpPr>
-          <p:nvPr>
-            <p:ph type="title"/>
-          </p:nvPr>
-        </p:nvSpPr>
-        <p:spPr/>
-        <p:txBody>
-          <a:bodyPr>
-            <a:normAutofit fontScale="90000"/>
-          </a:bodyPr>
-          <a:lstStyle/>
-          <a:p>
-            <a:r>
-              <a:rPr lang="en-GB" dirty="0" smtClean="0">
-                <a:solidFill>
-                  <a:srgbClr val="FF0000"/>
-                </a:solidFill>
-              </a:rPr>
-              <a:t>Save the Children Portal Page</a:t>
-            </a:r>
-            <a:endParaRPr lang="en-GB" dirty="0">
-              <a:solidFill>
-                <a:srgbClr val="FF0000"/>
-              </a:solidFill>
-            </a:endParaRPr>
-          </a:p>
-        </p:txBody>
-      </p:sp>
-      <p:sp>
-        <p:nvSpPr>
-          <p:cNvPr id="3" name="Content Placeholder 2"/>
-          <p:cNvSpPr>
-            <a:spLocks noGrp="1"/>
-          </p:cNvSpPr>
-          <p:nvPr>
-            <p:ph idx="1"/>
-          </p:nvPr>
-        </p:nvSpPr>
-        <p:spPr/>
-        <p:txBody>
-          <a:bodyPr/>
-          <a:lstStyle/>
-          <a:p>
-            <a:pPr marL="0" indent="0" algn="ctr">
-              <a:buNone/>
-            </a:pPr>
-            <a:r>
-              <a:rPr lang="en-GB" dirty="0">
-                <a:solidFill>
-                  <a:srgbClr val="FF0000"/>
-                </a:solidFill>
-              </a:rPr>
-              <a:t>Mapping of available stock </a:t>
-            </a:r>
-            <a:endParaRPr lang="en-GB" dirty="0" smtClean="0">
-              <a:solidFill>
-                <a:srgbClr val="FF0000"/>
-              </a:solidFill>
-            </a:endParaRPr>
-          </a:p>
-          <a:p>
-            <a:pPr marL="0" indent="0" algn="ctr">
-              <a:buNone/>
-            </a:pPr>
-            <a:endParaRPr lang="en-GB" dirty="0">
-              <a:solidFill>
-                <a:srgbClr val="FF0000"/>
-              </a:solidFill>
-            </a:endParaRPr>
-          </a:p>
-          <a:p>
-            <a:pPr marL="0" indent="0" algn="ctr">
-              <a:buNone/>
-            </a:pPr>
-            <a:r>
-              <a:rPr lang="en-GB" dirty="0" smtClean="0">
-                <a:solidFill>
-                  <a:srgbClr val="FF0000"/>
-                </a:solidFill>
-              </a:rPr>
-              <a:t>Stock accessed by the portal can be easily displayed by a map format</a:t>
-            </a:r>
-            <a:endParaRPr lang="en-GB" dirty="0">
-              <a:solidFill>
-                <a:srgbClr val="FF0000"/>
-              </a:solidFill>
-            </a:endParaRPr>
-          </a:p>
-        </p:txBody>
-      </p:sp>
-    </p:spTree>
-    <p:extLst>
-      <p:ext uri="{BB962C8B-B14F-4D97-AF65-F5344CB8AC3E}">
-        <p14:creationId xmlns:p14="http://schemas.microsoft.com/office/powerpoint/2010/main" val="3557105358"/>
-      </p:ext>
-    </p:extLst>
-  </p:cSld>
-  <p:clrMapOvr>
-    <a:masterClrMapping/>
-  </p:clrMapOvr>
-  <p:timing>
-    <p:tnLst>
-      <p:par>
-        <p:cTn xmlns:p14="http://schemas.microsoft.com/office/powerpoint/2010/main" id="1" dur="indefinite" restart="never" nodeType="tmRoot"/>
-      </p:par>
-    </p:tnLst>
-  </p:timing>
-</p:sld>
-</file>
-
-<file path=ppt/slides/slide33.xml><?xml version="1.0" encoding="utf-8"?>
-<p:sld xmlns:a="http://schemas.openxmlformats.org/drawingml/2006/main" xmlns:r="http://schemas.openxmlformats.org/officeDocument/2006/relationships" xmlns:p="http://schemas.openxmlformats.org/presentationml/2006/main">
-  <p:cSld>
-    <p:spTree>
-      <p:nvGrpSpPr>
-        <p:cNvPr id="1" name=""/>
-        <p:cNvGrpSpPr/>
-        <p:nvPr/>
-      </p:nvGrpSpPr>
-      <p:grpSpPr>
-        <a:xfrm>
-          <a:off x="0" y="0"/>
-          <a:ext cx="0" cy="0"/>
-          <a:chOff x="0" y="0"/>
-          <a:chExt cx="0" cy="0"/>
-        </a:xfrm>
-      </p:grpSpPr>
-      <p:sp>
-        <p:nvSpPr>
-          <p:cNvPr id="2" name="Title 1"/>
-          <p:cNvSpPr>
-            <a:spLocks noGrp="1"/>
-          </p:cNvSpPr>
-          <p:nvPr>
-            <p:ph type="title"/>
-          </p:nvPr>
-        </p:nvSpPr>
-        <p:spPr/>
-        <p:txBody>
-          <a:bodyPr>
-            <a:normAutofit fontScale="90000"/>
-          </a:bodyPr>
-          <a:lstStyle/>
-          <a:p>
-            <a:r>
-              <a:rPr lang="en-GB" dirty="0" smtClean="0">
-                <a:solidFill>
-                  <a:srgbClr val="FF0000"/>
-                </a:solidFill>
-              </a:rPr>
-              <a:t>Save the Children Portal Page</a:t>
-            </a:r>
-            <a:endParaRPr lang="en-GB" dirty="0">
-              <a:solidFill>
-                <a:srgbClr val="FF0000"/>
-              </a:solidFill>
-            </a:endParaRPr>
-          </a:p>
-        </p:txBody>
-      </p:sp>
-      <p:sp>
-        <p:nvSpPr>
-          <p:cNvPr id="3" name="Content Placeholder 2"/>
-          <p:cNvSpPr>
-            <a:spLocks noGrp="1"/>
-          </p:cNvSpPr>
-          <p:nvPr>
-            <p:ph idx="1"/>
-          </p:nvPr>
-        </p:nvSpPr>
-        <p:spPr/>
-        <p:txBody>
-          <a:bodyPr>
-            <a:normAutofit fontScale="92500" lnSpcReduction="20000"/>
-          </a:bodyPr>
-          <a:lstStyle/>
-          <a:p>
-            <a:pPr marL="0" indent="0" algn="ctr">
-              <a:buNone/>
-            </a:pPr>
-            <a:r>
-              <a:rPr lang="en-GB" sz="2000" dirty="0">
-                <a:solidFill>
-                  <a:srgbClr val="FF0000"/>
-                </a:solidFill>
-              </a:rPr>
-              <a:t>To manage the problem of ad-hoc distribution of donations, the portal will offer donors the capability to register a collection centre that can link into Save the Children’s distribution network</a:t>
-            </a:r>
-            <a:r>
-              <a:rPr lang="en-GB" sz="2000" dirty="0" smtClean="0">
-                <a:solidFill>
-                  <a:srgbClr val="FF0000"/>
-                </a:solidFill>
-              </a:rPr>
-              <a:t>.</a:t>
-            </a:r>
-          </a:p>
-          <a:p>
-            <a:pPr lvl="0"/>
-            <a:endParaRPr lang="en-GB" sz="2000" dirty="0">
-              <a:solidFill>
-                <a:srgbClr val="FF0000"/>
-              </a:solidFill>
-            </a:endParaRPr>
-          </a:p>
-          <a:p>
-            <a:pPr lvl="0"/>
-            <a:r>
-              <a:rPr lang="en-GB" sz="2000" dirty="0" smtClean="0">
-                <a:solidFill>
-                  <a:srgbClr val="FF0000"/>
-                </a:solidFill>
-              </a:rPr>
-              <a:t>The </a:t>
-            </a:r>
-            <a:r>
-              <a:rPr lang="en-GB" sz="2000" dirty="0">
-                <a:solidFill>
-                  <a:srgbClr val="FF0000"/>
-                </a:solidFill>
-              </a:rPr>
-              <a:t>portal can provide advice and information about suitable items for donation and restricted items such as breast milk substitutes.</a:t>
-            </a:r>
-          </a:p>
-          <a:p>
-            <a:pPr lvl="0"/>
-            <a:r>
-              <a:rPr lang="en-GB" sz="2000" dirty="0">
-                <a:solidFill>
-                  <a:srgbClr val="FF0000"/>
-                </a:solidFill>
-              </a:rPr>
-              <a:t>It allows the individual or organisation to register a collection centre and provide information about the “collection event” including when and where.</a:t>
-            </a:r>
-          </a:p>
-          <a:p>
-            <a:pPr lvl="0"/>
-            <a:r>
-              <a:rPr lang="en-GB" sz="2000" dirty="0">
-                <a:solidFill>
-                  <a:srgbClr val="FF0000"/>
-                </a:solidFill>
-              </a:rPr>
-              <a:t>Identifies a suitable distribution centre(s) where the donated items should be delivered.</a:t>
-            </a:r>
-          </a:p>
-          <a:p>
-            <a:pPr lvl="0"/>
-            <a:r>
-              <a:rPr lang="en-GB" sz="2000" dirty="0">
-                <a:solidFill>
-                  <a:srgbClr val="FF0000"/>
-                </a:solidFill>
-              </a:rPr>
-              <a:t>Provides feedback to the donor about where their donated items have been used.</a:t>
-            </a:r>
-          </a:p>
-        </p:txBody>
-      </p:sp>
-    </p:spTree>
-    <p:extLst>
-      <p:ext uri="{BB962C8B-B14F-4D97-AF65-F5344CB8AC3E}">
-        <p14:creationId xmlns:p14="http://schemas.microsoft.com/office/powerpoint/2010/main" val="4205917677"/>
-      </p:ext>
-    </p:extLst>
-  </p:cSld>
-  <p:clrMapOvr>
-    <a:masterClrMapping/>
-  </p:clrMapOvr>
-  <p:timing>
-    <p:tnLst>
-      <p:par>
-        <p:cTn xmlns:p14="http://schemas.microsoft.com/office/powerpoint/2010/main" id="1" dur="indefinite" restart="never" nodeType="tmRoot"/>
-      </p:par>
-    </p:tnLst>
-  </p:timing>
-</p:sld>
-</file>
-
-<file path=ppt/slides/slide34.xml><?xml version="1.0" encoding="utf-8"?>
-<p:sld xmlns:a="http://schemas.openxmlformats.org/drawingml/2006/main" xmlns:r="http://schemas.openxmlformats.org/officeDocument/2006/relationships" xmlns:p="http://schemas.openxmlformats.org/presentationml/2006/main">
-  <p:cSld>
-    <p:spTree>
-      <p:nvGrpSpPr>
-        <p:cNvPr id="1" name=""/>
-        <p:cNvGrpSpPr/>
-        <p:nvPr/>
-      </p:nvGrpSpPr>
-      <p:grpSpPr>
-        <a:xfrm>
-          <a:off x="0" y="0"/>
-          <a:ext cx="0" cy="0"/>
-          <a:chOff x="0" y="0"/>
-          <a:chExt cx="0" cy="0"/>
-        </a:xfrm>
-      </p:grpSpPr>
-      <p:sp>
-        <p:nvSpPr>
-          <p:cNvPr id="2" name="Title 1"/>
-          <p:cNvSpPr>
-            <a:spLocks noGrp="1"/>
-          </p:cNvSpPr>
-          <p:nvPr>
-            <p:ph type="title"/>
-          </p:nvPr>
-        </p:nvSpPr>
-        <p:spPr/>
-        <p:txBody>
-          <a:bodyPr>
-            <a:normAutofit fontScale="90000"/>
-          </a:bodyPr>
-          <a:lstStyle/>
-          <a:p>
-            <a:r>
-              <a:rPr lang="en-GB" dirty="0" smtClean="0">
-                <a:solidFill>
-                  <a:srgbClr val="FF0000"/>
-                </a:solidFill>
-              </a:rPr>
-              <a:t>Save the Children Portal Page</a:t>
-            </a:r>
-            <a:endParaRPr lang="en-GB" dirty="0">
-              <a:solidFill>
-                <a:srgbClr val="FF0000"/>
-              </a:solidFill>
-            </a:endParaRPr>
-          </a:p>
-        </p:txBody>
-      </p:sp>
-      <p:sp>
-        <p:nvSpPr>
-          <p:cNvPr id="3" name="Content Placeholder 2"/>
-          <p:cNvSpPr>
-            <a:spLocks noGrp="1"/>
-          </p:cNvSpPr>
-          <p:nvPr>
-            <p:ph idx="1"/>
-          </p:nvPr>
-        </p:nvSpPr>
-        <p:spPr/>
-        <p:txBody>
-          <a:bodyPr/>
-          <a:lstStyle/>
-          <a:p>
-            <a:pPr marL="0" indent="0" algn="ctr">
-              <a:buNone/>
-            </a:pPr>
-            <a:r>
-              <a:rPr lang="en-GB" dirty="0" smtClean="0">
-                <a:solidFill>
-                  <a:srgbClr val="FF0000"/>
-                </a:solidFill>
-              </a:rPr>
-              <a:t>View/Download Information</a:t>
-            </a:r>
-          </a:p>
-          <a:p>
-            <a:pPr marL="0" indent="0" algn="ctr">
-              <a:buNone/>
-            </a:pPr>
-            <a:endParaRPr lang="en-GB" dirty="0" smtClean="0">
-              <a:solidFill>
-                <a:srgbClr val="FF0000"/>
-              </a:solidFill>
-            </a:endParaRPr>
-          </a:p>
-          <a:p>
-            <a:r>
-              <a:rPr lang="en-GB" sz="2000" dirty="0" smtClean="0">
-                <a:solidFill>
-                  <a:srgbClr val="FF0000"/>
-                </a:solidFill>
-              </a:rPr>
-              <a:t>Download </a:t>
-            </a:r>
-            <a:r>
-              <a:rPr lang="en-GB" sz="2000" dirty="0">
-                <a:solidFill>
-                  <a:srgbClr val="FF0000"/>
-                </a:solidFill>
-              </a:rPr>
-              <a:t>information on the nearest distribution centre of </a:t>
-            </a:r>
-            <a:r>
-              <a:rPr lang="en-GB" sz="2000" dirty="0" smtClean="0">
-                <a:solidFill>
-                  <a:srgbClr val="FF0000"/>
-                </a:solidFill>
-              </a:rPr>
-              <a:t>aid</a:t>
-            </a:r>
-          </a:p>
-          <a:p>
-            <a:r>
-              <a:rPr lang="en-GB" sz="2000" dirty="0">
-                <a:solidFill>
-                  <a:srgbClr val="FF0000"/>
-                </a:solidFill>
-              </a:rPr>
-              <a:t>A map will be shown of where suppliers can donate emergency </a:t>
-            </a:r>
-            <a:r>
-              <a:rPr lang="en-GB" sz="2000" dirty="0" smtClean="0">
-                <a:solidFill>
-                  <a:srgbClr val="FF0000"/>
-                </a:solidFill>
-              </a:rPr>
-              <a:t>supplies</a:t>
-            </a:r>
-          </a:p>
-          <a:p>
-            <a:r>
-              <a:rPr lang="en-GB" sz="2000" dirty="0">
-                <a:solidFill>
-                  <a:srgbClr val="FF0000"/>
-                </a:solidFill>
-              </a:rPr>
-              <a:t>Information will be supplied on reports that have unsolicited milk distributions</a:t>
-            </a:r>
-          </a:p>
-          <a:p>
-            <a:r>
-              <a:rPr lang="en-GB" sz="2000" dirty="0">
-                <a:solidFill>
-                  <a:srgbClr val="FF0000"/>
-                </a:solidFill>
-              </a:rPr>
-              <a:t>Information of breast milk is the best way to feed </a:t>
-            </a:r>
-            <a:r>
-              <a:rPr lang="en-GB" sz="2000" dirty="0" smtClean="0">
-                <a:solidFill>
-                  <a:srgbClr val="FF0000"/>
-                </a:solidFill>
-              </a:rPr>
-              <a:t>children</a:t>
-            </a:r>
-          </a:p>
-          <a:p>
-            <a:endParaRPr lang="en-GB" sz="2000" dirty="0">
-              <a:solidFill>
-                <a:srgbClr val="FF0000"/>
-              </a:solidFill>
-            </a:endParaRPr>
-          </a:p>
-          <a:p>
-            <a:endParaRPr lang="en-GB" sz="2000" dirty="0">
-              <a:solidFill>
-                <a:srgbClr val="FF0000"/>
-              </a:solidFill>
-            </a:endParaRPr>
-          </a:p>
-          <a:p>
-            <a:pPr marL="0" indent="0" algn="ctr">
-              <a:buNone/>
-            </a:pPr>
-            <a:endParaRPr lang="en-GB" dirty="0" smtClean="0">
-              <a:solidFill>
-                <a:srgbClr val="FF0000"/>
-              </a:solidFill>
-            </a:endParaRPr>
-          </a:p>
-          <a:p>
-            <a:pPr marL="0" indent="0">
-              <a:buNone/>
-            </a:pPr>
-            <a:endParaRPr lang="en-GB" dirty="0"/>
-          </a:p>
-        </p:txBody>
-      </p:sp>
-    </p:spTree>
-    <p:extLst>
-      <p:ext uri="{BB962C8B-B14F-4D97-AF65-F5344CB8AC3E}">
-        <p14:creationId xmlns:p14="http://schemas.microsoft.com/office/powerpoint/2010/main" val="733480904"/>
-      </p:ext>
-    </p:extLst>
-  </p:cSld>
-  <p:clrMapOvr>
-    <a:masterClrMapping/>
-  </p:clrMapOvr>
-  <p:timing>
-    <p:tnLst>
-      <p:par>
-        <p:cTn xmlns:p14="http://schemas.microsoft.com/office/powerpoint/2010/main" id="1" dur="indefinite" restart="never" nodeType="tmRoot"/>
-      </p:par>
-    </p:tnLst>
-  </p:timing>
-</p:sld>
-</file>
-
-<file path=ppt/slides/slide35.xml><?xml version="1.0" encoding="utf-8"?>
-<p:sld xmlns:a="http://schemas.openxmlformats.org/drawingml/2006/main" xmlns:r="http://schemas.openxmlformats.org/officeDocument/2006/relationships" xmlns:p="http://schemas.openxmlformats.org/presentationml/2006/main">
-  <p:cSld>
-    <p:spTree>
-      <p:nvGrpSpPr>
-        <p:cNvPr id="1" name=""/>
-        <p:cNvGrpSpPr/>
-        <p:nvPr/>
-      </p:nvGrpSpPr>
-      <p:grpSpPr>
-        <a:xfrm>
-          <a:off x="0" y="0"/>
-          <a:ext cx="0" cy="0"/>
-          <a:chOff x="0" y="0"/>
-          <a:chExt cx="0" cy="0"/>
-        </a:xfrm>
-      </p:grpSpPr>
-      <p:sp>
-        <p:nvSpPr>
-          <p:cNvPr id="2" name="Title 1"/>
-          <p:cNvSpPr>
-            <a:spLocks noGrp="1"/>
-          </p:cNvSpPr>
-          <p:nvPr>
-            <p:ph type="title"/>
-          </p:nvPr>
-        </p:nvSpPr>
-        <p:spPr/>
-        <p:txBody>
-          <a:bodyPr>
-            <a:normAutofit fontScale="90000"/>
-          </a:bodyPr>
-          <a:lstStyle/>
-          <a:p>
-            <a:r>
-              <a:rPr lang="en-GB" dirty="0" smtClean="0"/>
-              <a:t>Save the children portal home page</a:t>
-            </a:r>
-            <a:endParaRPr lang="en-GB" dirty="0"/>
+          <a:bodyPr/>
+          <a:lstStyle/>
+          <a:p>
+            <a:pPr algn="ctr"/>
+            <a:r>
+              <a:rPr lang="en-US" dirty="0" smtClean="0"/>
+              <a:t>Thank you</a:t>
+            </a:r>
+            <a:endParaRPr lang="en-US" dirty="0"/>
           </a:p>
         </p:txBody>
       </p:sp>
       <p:pic>
         <p:nvPicPr>
-          <p:cNvPr id="3" name="Picture 2" descr="HomePage.png"/>
+          <p:cNvPr id="6" name="Content Placeholder 5" descr="save-the-children-logo.jpg"/>
           <p:cNvPicPr>
-            <a:picLocks noChangeAspect="1"/>
+            <a:picLocks noGrp="1" noChangeAspect="1"/>
           </p:cNvPicPr>
-          <p:nvPr/>
+          <p:nvPr>
+            <p:ph idx="1"/>
+          </p:nvPr>
         </p:nvPicPr>
         <p:blipFill>
           <a:blip r:embed="rId2">
@@ -9092,37 +8215,28 @@
               </a:ext>
             </a:extLst>
           </a:blip>
+          <a:srcRect l="-31734" r="-31734"/>
           <a:stretch>
             <a:fillRect/>
           </a:stretch>
         </p:blipFill>
         <p:spPr>
           <a:xfrm>
-            <a:off x="0" y="1412776"/>
-            <a:ext cx="9144000" cy="5715000"/>
+            <a:off x="762000" y="685800"/>
+            <a:ext cx="7543800" cy="4614863"/>
           </a:xfrm>
-          <a:prstGeom prst="rect">
-            <a:avLst/>
-          </a:prstGeom>
         </p:spPr>
       </p:pic>
     </p:spTree>
     <p:extLst>
       <p:ext uri="{BB962C8B-B14F-4D97-AF65-F5344CB8AC3E}">
-        <p14:creationId xmlns:p14="http://schemas.microsoft.com/office/powerpoint/2010/main" val="1671797532"/>
+        <p14:creationId xmlns:p14="http://schemas.microsoft.com/office/powerpoint/2010/main" val="2648319885"/>
       </p:ext>
     </p:extLst>
   </p:cSld>
   <p:clrMapOvr>
     <a:masterClrMapping/>
   </p:clrMapOvr>
-  <p:timing>
-    <p:tnLst>
-      <p:par>
-        <p:cTn xmlns:p14="http://schemas.microsoft.com/office/powerpoint/2010/main" id="1" dur="indefinite" restart="never" nodeType="tmRoot"/>
-      </p:par>
-    </p:tnLst>
-  </p:timing>
 </p:sld>
 </file>
 

</xml_diff>